<commit_message>
Update icones ui elements
</commit_message>
<xml_diff>
--- a/icones-ui-ux-github .pptx
+++ b/icones-ui-ux-github .pptx
@@ -3586,7 +3586,7 @@
             <a:r>
               <a:rPr lang="pt-BR" sz="2400" dirty="0" err="1">
                 <a:solidFill>
-                  <a:srgbClr val="E89B26"/>
+                  <a:srgbClr val="B5DE00"/>
                 </a:solidFill>
                 <a:latin typeface="Tahoma" panose="020B0604030504040204" pitchFamily="34" charset="0"/>
                 <a:ea typeface="Tahoma" panose="020B0604030504040204" pitchFamily="34" charset="0"/>
@@ -3596,7 +3596,7 @@
             </a:r>
             <a:endParaRPr lang="pt-BR" sz="2400" dirty="0">
               <a:solidFill>
-                <a:srgbClr val="E89B26"/>
+                <a:srgbClr val="B5DE00"/>
               </a:solidFill>
               <a:latin typeface="Tahoma" panose="020B0604030504040204" pitchFamily="34" charset="0"/>
               <a:ea typeface="Tahoma" panose="020B0604030504040204" pitchFamily="34" charset="0"/>
@@ -3605,6 +3605,185 @@
           </a:p>
         </p:txBody>
       </p:sp>
+      <p:sp>
+        <p:nvSpPr>
+          <p:cNvPr id="2" name="Retângulo 1">
+            <a:extLst>
+              <a:ext uri="{FF2B5EF4-FFF2-40B4-BE49-F238E27FC236}">
+                <a16:creationId xmlns:a16="http://schemas.microsoft.com/office/drawing/2014/main" id="{3AC63CC5-DAE8-433A-BBBC-A8718D7D9FED}"/>
+              </a:ext>
+            </a:extLst>
+          </p:cNvPr>
+          <p:cNvSpPr/>
+          <p:nvPr/>
+        </p:nvSpPr>
+        <p:spPr>
+          <a:xfrm>
+            <a:off x="0" y="0"/>
+            <a:ext cx="1979612" cy="1979613"/>
+          </a:xfrm>
+          <a:prstGeom prst="rect">
+            <a:avLst/>
+          </a:prstGeom>
+          <a:noFill/>
+          <a:ln w="15875">
+            <a:solidFill>
+              <a:schemeClr val="bg1">
+                <a:lumMod val="65000"/>
+              </a:schemeClr>
+            </a:solidFill>
+          </a:ln>
+        </p:spPr>
+        <p:style>
+          <a:lnRef idx="2">
+            <a:schemeClr val="accent1">
+              <a:shade val="50000"/>
+            </a:schemeClr>
+          </a:lnRef>
+          <a:fillRef idx="1">
+            <a:schemeClr val="accent1"/>
+          </a:fillRef>
+          <a:effectRef idx="0">
+            <a:schemeClr val="accent1"/>
+          </a:effectRef>
+          <a:fontRef idx="minor">
+            <a:schemeClr val="lt1"/>
+          </a:fontRef>
+        </p:style>
+        <p:txBody>
+          <a:bodyPr rtlCol="0" anchor="ctr"/>
+          <a:lstStyle/>
+          <a:p>
+            <a:pPr algn="ctr"/>
+            <a:endParaRPr lang="pt-BR"/>
+          </a:p>
+        </p:txBody>
+      </p:sp>
+      <p:grpSp>
+        <p:nvGrpSpPr>
+          <p:cNvPr id="8" name="Agrupar 7">
+            <a:extLst>
+              <a:ext uri="{FF2B5EF4-FFF2-40B4-BE49-F238E27FC236}">
+                <a16:creationId xmlns:a16="http://schemas.microsoft.com/office/drawing/2014/main" id="{BD0CD874-CB81-4638-BDE4-CF4B4181792F}"/>
+              </a:ext>
+            </a:extLst>
+          </p:cNvPr>
+          <p:cNvGrpSpPr/>
+          <p:nvPr/>
+        </p:nvGrpSpPr>
+        <p:grpSpPr>
+          <a:xfrm>
+            <a:off x="-246392" y="36254"/>
+            <a:ext cx="161800" cy="422289"/>
+            <a:chOff x="-246392" y="36254"/>
+            <a:chExt cx="161800" cy="422289"/>
+          </a:xfrm>
+        </p:grpSpPr>
+        <p:sp>
+          <p:nvSpPr>
+            <p:cNvPr id="6" name="Retângulo 5">
+              <a:extLst>
+                <a:ext uri="{FF2B5EF4-FFF2-40B4-BE49-F238E27FC236}">
+                  <a16:creationId xmlns:a16="http://schemas.microsoft.com/office/drawing/2014/main" id="{7F9D782E-96F2-4379-8E44-71006B78A728}"/>
+                </a:ext>
+              </a:extLst>
+            </p:cNvPr>
+            <p:cNvSpPr/>
+            <p:nvPr/>
+          </p:nvSpPr>
+          <p:spPr>
+            <a:xfrm>
+              <a:off x="-241692" y="36254"/>
+              <a:ext cx="157100" cy="185297"/>
+            </a:xfrm>
+            <a:prstGeom prst="rect">
+              <a:avLst/>
+            </a:prstGeom>
+            <a:solidFill>
+              <a:srgbClr val="B5DE00"/>
+            </a:solidFill>
+            <a:ln>
+              <a:noFill/>
+            </a:ln>
+          </p:spPr>
+          <p:style>
+            <a:lnRef idx="2">
+              <a:schemeClr val="accent1">
+                <a:shade val="50000"/>
+              </a:schemeClr>
+            </a:lnRef>
+            <a:fillRef idx="1">
+              <a:schemeClr val="accent1"/>
+            </a:fillRef>
+            <a:effectRef idx="0">
+              <a:schemeClr val="accent1"/>
+            </a:effectRef>
+            <a:fontRef idx="minor">
+              <a:schemeClr val="lt1"/>
+            </a:fontRef>
+          </p:style>
+          <p:txBody>
+            <a:bodyPr rtlCol="0" anchor="ctr"/>
+            <a:lstStyle/>
+            <a:p>
+              <a:pPr algn="ctr"/>
+              <a:endParaRPr lang="pt-BR"/>
+            </a:p>
+          </p:txBody>
+        </p:sp>
+        <p:sp>
+          <p:nvSpPr>
+            <p:cNvPr id="7" name="Retângulo 6">
+              <a:extLst>
+                <a:ext uri="{FF2B5EF4-FFF2-40B4-BE49-F238E27FC236}">
+                  <a16:creationId xmlns:a16="http://schemas.microsoft.com/office/drawing/2014/main" id="{602722E6-AFAF-483F-A211-690545AE516B}"/>
+                </a:ext>
+              </a:extLst>
+            </p:cNvPr>
+            <p:cNvSpPr/>
+            <p:nvPr/>
+          </p:nvSpPr>
+          <p:spPr>
+            <a:xfrm>
+              <a:off x="-246392" y="273246"/>
+              <a:ext cx="157100" cy="185297"/>
+            </a:xfrm>
+            <a:prstGeom prst="rect">
+              <a:avLst/>
+            </a:prstGeom>
+            <a:solidFill>
+              <a:srgbClr val="34977E"/>
+            </a:solidFill>
+            <a:ln>
+              <a:noFill/>
+            </a:ln>
+          </p:spPr>
+          <p:style>
+            <a:lnRef idx="2">
+              <a:schemeClr val="accent1">
+                <a:shade val="50000"/>
+              </a:schemeClr>
+            </a:lnRef>
+            <a:fillRef idx="1">
+              <a:schemeClr val="accent1"/>
+            </a:fillRef>
+            <a:effectRef idx="0">
+              <a:schemeClr val="accent1"/>
+            </a:effectRef>
+            <a:fontRef idx="minor">
+              <a:schemeClr val="lt1"/>
+            </a:fontRef>
+          </p:style>
+          <p:txBody>
+            <a:bodyPr rtlCol="0" anchor="ctr"/>
+            <a:lstStyle/>
+            <a:p>
+              <a:pPr algn="ctr"/>
+              <a:endParaRPr lang="pt-BR"/>
+            </a:p>
+          </p:txBody>
+        </p:sp>
+      </p:grpSp>
     </p:spTree>
     <p:extLst>
       <p:ext uri="{BB962C8B-B14F-4D97-AF65-F5344CB8AC3E}">
@@ -3675,7 +3854,7 @@
             <a:r>
               <a:rPr lang="pt-BR" sz="2400" dirty="0" err="1">
                 <a:solidFill>
-                  <a:srgbClr val="E89B26"/>
+                  <a:srgbClr val="B5DE00"/>
                 </a:solidFill>
                 <a:latin typeface="Tahoma" panose="020B0604030504040204" pitchFamily="34" charset="0"/>
                 <a:ea typeface="Tahoma" panose="020B0604030504040204" pitchFamily="34" charset="0"/>
@@ -3685,7 +3864,7 @@
             </a:r>
             <a:endParaRPr lang="pt-BR" sz="2400" dirty="0">
               <a:solidFill>
-                <a:srgbClr val="E89B26"/>
+                <a:srgbClr val="B5DE00"/>
               </a:solidFill>
               <a:latin typeface="Tahoma" panose="020B0604030504040204" pitchFamily="34" charset="0"/>
               <a:ea typeface="Tahoma" panose="020B0604030504040204" pitchFamily="34" charset="0"/>
@@ -3694,6 +3873,185 @@
           </a:p>
         </p:txBody>
       </p:sp>
+      <p:sp>
+        <p:nvSpPr>
+          <p:cNvPr id="3" name="Retângulo 2">
+            <a:extLst>
+              <a:ext uri="{FF2B5EF4-FFF2-40B4-BE49-F238E27FC236}">
+                <a16:creationId xmlns:a16="http://schemas.microsoft.com/office/drawing/2014/main" id="{7DF643DA-8151-48AC-A3F8-9A85CCAFF573}"/>
+              </a:ext>
+            </a:extLst>
+          </p:cNvPr>
+          <p:cNvSpPr/>
+          <p:nvPr/>
+        </p:nvSpPr>
+        <p:spPr>
+          <a:xfrm>
+            <a:off x="0" y="0"/>
+            <a:ext cx="1979612" cy="1979613"/>
+          </a:xfrm>
+          <a:prstGeom prst="rect">
+            <a:avLst/>
+          </a:prstGeom>
+          <a:noFill/>
+          <a:ln w="15875">
+            <a:solidFill>
+              <a:schemeClr val="bg1">
+                <a:lumMod val="65000"/>
+              </a:schemeClr>
+            </a:solidFill>
+          </a:ln>
+        </p:spPr>
+        <p:style>
+          <a:lnRef idx="2">
+            <a:schemeClr val="accent1">
+              <a:shade val="50000"/>
+            </a:schemeClr>
+          </a:lnRef>
+          <a:fillRef idx="1">
+            <a:schemeClr val="accent1"/>
+          </a:fillRef>
+          <a:effectRef idx="0">
+            <a:schemeClr val="accent1"/>
+          </a:effectRef>
+          <a:fontRef idx="minor">
+            <a:schemeClr val="lt1"/>
+          </a:fontRef>
+        </p:style>
+        <p:txBody>
+          <a:bodyPr rtlCol="0" anchor="ctr"/>
+          <a:lstStyle/>
+          <a:p>
+            <a:pPr algn="ctr"/>
+            <a:endParaRPr lang="pt-BR"/>
+          </a:p>
+        </p:txBody>
+      </p:sp>
+      <p:grpSp>
+        <p:nvGrpSpPr>
+          <p:cNvPr id="5" name="Agrupar 4">
+            <a:extLst>
+              <a:ext uri="{FF2B5EF4-FFF2-40B4-BE49-F238E27FC236}">
+                <a16:creationId xmlns:a16="http://schemas.microsoft.com/office/drawing/2014/main" id="{E4260147-AE77-46B5-9171-7E89A510040D}"/>
+              </a:ext>
+            </a:extLst>
+          </p:cNvPr>
+          <p:cNvGrpSpPr/>
+          <p:nvPr/>
+        </p:nvGrpSpPr>
+        <p:grpSpPr>
+          <a:xfrm>
+            <a:off x="-246392" y="36254"/>
+            <a:ext cx="161800" cy="422289"/>
+            <a:chOff x="-246392" y="36254"/>
+            <a:chExt cx="161800" cy="422289"/>
+          </a:xfrm>
+        </p:grpSpPr>
+        <p:sp>
+          <p:nvSpPr>
+            <p:cNvPr id="6" name="Retângulo 5">
+              <a:extLst>
+                <a:ext uri="{FF2B5EF4-FFF2-40B4-BE49-F238E27FC236}">
+                  <a16:creationId xmlns:a16="http://schemas.microsoft.com/office/drawing/2014/main" id="{BA44BA47-7E9D-4DE2-AB99-34F4A7404E30}"/>
+                </a:ext>
+              </a:extLst>
+            </p:cNvPr>
+            <p:cNvSpPr/>
+            <p:nvPr/>
+          </p:nvSpPr>
+          <p:spPr>
+            <a:xfrm>
+              <a:off x="-241692" y="36254"/>
+              <a:ext cx="157100" cy="185297"/>
+            </a:xfrm>
+            <a:prstGeom prst="rect">
+              <a:avLst/>
+            </a:prstGeom>
+            <a:solidFill>
+              <a:srgbClr val="B5DE00"/>
+            </a:solidFill>
+            <a:ln>
+              <a:noFill/>
+            </a:ln>
+          </p:spPr>
+          <p:style>
+            <a:lnRef idx="2">
+              <a:schemeClr val="accent1">
+                <a:shade val="50000"/>
+              </a:schemeClr>
+            </a:lnRef>
+            <a:fillRef idx="1">
+              <a:schemeClr val="accent1"/>
+            </a:fillRef>
+            <a:effectRef idx="0">
+              <a:schemeClr val="accent1"/>
+            </a:effectRef>
+            <a:fontRef idx="minor">
+              <a:schemeClr val="lt1"/>
+            </a:fontRef>
+          </p:style>
+          <p:txBody>
+            <a:bodyPr rtlCol="0" anchor="ctr"/>
+            <a:lstStyle/>
+            <a:p>
+              <a:pPr algn="ctr"/>
+              <a:endParaRPr lang="pt-BR"/>
+            </a:p>
+          </p:txBody>
+        </p:sp>
+        <p:sp>
+          <p:nvSpPr>
+            <p:cNvPr id="7" name="Retângulo 6">
+              <a:extLst>
+                <a:ext uri="{FF2B5EF4-FFF2-40B4-BE49-F238E27FC236}">
+                  <a16:creationId xmlns:a16="http://schemas.microsoft.com/office/drawing/2014/main" id="{95C2F476-9DBA-4AF9-ADD0-851074907201}"/>
+                </a:ext>
+              </a:extLst>
+            </p:cNvPr>
+            <p:cNvSpPr/>
+            <p:nvPr/>
+          </p:nvSpPr>
+          <p:spPr>
+            <a:xfrm>
+              <a:off x="-246392" y="273246"/>
+              <a:ext cx="157100" cy="185297"/>
+            </a:xfrm>
+            <a:prstGeom prst="rect">
+              <a:avLst/>
+            </a:prstGeom>
+            <a:solidFill>
+              <a:srgbClr val="34977E"/>
+            </a:solidFill>
+            <a:ln>
+              <a:noFill/>
+            </a:ln>
+          </p:spPr>
+          <p:style>
+            <a:lnRef idx="2">
+              <a:schemeClr val="accent1">
+                <a:shade val="50000"/>
+              </a:schemeClr>
+            </a:lnRef>
+            <a:fillRef idx="1">
+              <a:schemeClr val="accent1"/>
+            </a:fillRef>
+            <a:effectRef idx="0">
+              <a:schemeClr val="accent1"/>
+            </a:effectRef>
+            <a:fontRef idx="minor">
+              <a:schemeClr val="lt1"/>
+            </a:fontRef>
+          </p:style>
+          <p:txBody>
+            <a:bodyPr rtlCol="0" anchor="ctr"/>
+            <a:lstStyle/>
+            <a:p>
+              <a:pPr algn="ctr"/>
+              <a:endParaRPr lang="pt-BR"/>
+            </a:p>
+          </p:txBody>
+        </p:sp>
+      </p:grpSp>
     </p:spTree>
     <p:extLst>
       <p:ext uri="{BB962C8B-B14F-4D97-AF65-F5344CB8AC3E}">
@@ -3746,7 +4104,7 @@
         </p:nvSpPr>
         <p:spPr>
           <a:xfrm>
-            <a:off x="-1" y="721401"/>
+            <a:off x="-1" y="605879"/>
             <a:ext cx="1979613" cy="769441"/>
           </a:xfrm>
           <a:prstGeom prst="rect">
@@ -3760,6 +4118,7 @@
           </a:bodyPr>
           <a:lstStyle/>
           <a:p>
+            <a:pPr algn="ctr"/>
             <a:r>
               <a:rPr lang="pt-BR" sz="2000" dirty="0">
                 <a:solidFill>
@@ -3769,10 +4128,22 @@
                 <a:ea typeface="Tahoma" panose="020B0604030504040204" pitchFamily="34" charset="0"/>
                 <a:cs typeface="Tahoma" panose="020B0604030504040204" pitchFamily="34" charset="0"/>
               </a:rPr>
-              <a:t> Cloud &amp; Edge</a:t>
-            </a:r>
-          </a:p>
-          <a:p>
+              <a:t> </a:t>
+            </a:r>
+            <a:r>
+              <a:rPr lang="pt-BR" sz="2000" dirty="0">
+                <a:solidFill>
+                  <a:srgbClr val="B5DE00"/>
+                </a:solidFill>
+                <a:latin typeface="Tahoma" panose="020B0604030504040204" pitchFamily="34" charset="0"/>
+                <a:ea typeface="Tahoma" panose="020B0604030504040204" pitchFamily="34" charset="0"/>
+                <a:cs typeface="Tahoma" panose="020B0604030504040204" pitchFamily="34" charset="0"/>
+              </a:rPr>
+              <a:t>Cloud &amp; Edge</a:t>
+            </a:r>
+          </a:p>
+          <a:p>
+            <a:pPr algn="ctr"/>
             <a:r>
               <a:rPr lang="pt-BR" sz="2400" dirty="0">
                 <a:solidFill>
@@ -3787,7 +4158,7 @@
             <a:r>
               <a:rPr lang="pt-BR" sz="2400" dirty="0" err="1">
                 <a:solidFill>
-                  <a:srgbClr val="E89B26"/>
+                  <a:srgbClr val="34977E"/>
                 </a:solidFill>
                 <a:latin typeface="Tahoma" panose="020B0604030504040204" pitchFamily="34" charset="0"/>
                 <a:ea typeface="Tahoma" panose="020B0604030504040204" pitchFamily="34" charset="0"/>
@@ -3797,7 +4168,7 @@
             </a:r>
             <a:endParaRPr lang="pt-BR" sz="2400" dirty="0">
               <a:solidFill>
-                <a:srgbClr val="E89B26"/>
+                <a:srgbClr val="34977E"/>
               </a:solidFill>
               <a:latin typeface="Tahoma" panose="020B0604030504040204" pitchFamily="34" charset="0"/>
               <a:ea typeface="Tahoma" panose="020B0604030504040204" pitchFamily="34" charset="0"/>
@@ -3806,6 +4177,185 @@
           </a:p>
         </p:txBody>
       </p:sp>
+      <p:sp>
+        <p:nvSpPr>
+          <p:cNvPr id="3" name="Retângulo 2">
+            <a:extLst>
+              <a:ext uri="{FF2B5EF4-FFF2-40B4-BE49-F238E27FC236}">
+                <a16:creationId xmlns:a16="http://schemas.microsoft.com/office/drawing/2014/main" id="{51C7FECB-AB17-420D-8BA3-C5F3E5809328}"/>
+              </a:ext>
+            </a:extLst>
+          </p:cNvPr>
+          <p:cNvSpPr/>
+          <p:nvPr/>
+        </p:nvSpPr>
+        <p:spPr>
+          <a:xfrm>
+            <a:off x="0" y="0"/>
+            <a:ext cx="1979612" cy="1979613"/>
+          </a:xfrm>
+          <a:prstGeom prst="rect">
+            <a:avLst/>
+          </a:prstGeom>
+          <a:noFill/>
+          <a:ln w="15875">
+            <a:solidFill>
+              <a:schemeClr val="bg1">
+                <a:lumMod val="65000"/>
+              </a:schemeClr>
+            </a:solidFill>
+          </a:ln>
+        </p:spPr>
+        <p:style>
+          <a:lnRef idx="2">
+            <a:schemeClr val="accent1">
+              <a:shade val="50000"/>
+            </a:schemeClr>
+          </a:lnRef>
+          <a:fillRef idx="1">
+            <a:schemeClr val="accent1"/>
+          </a:fillRef>
+          <a:effectRef idx="0">
+            <a:schemeClr val="accent1"/>
+          </a:effectRef>
+          <a:fontRef idx="minor">
+            <a:schemeClr val="lt1"/>
+          </a:fontRef>
+        </p:style>
+        <p:txBody>
+          <a:bodyPr rtlCol="0" anchor="ctr"/>
+          <a:lstStyle/>
+          <a:p>
+            <a:pPr algn="ctr"/>
+            <a:endParaRPr lang="pt-BR"/>
+          </a:p>
+        </p:txBody>
+      </p:sp>
+      <p:grpSp>
+        <p:nvGrpSpPr>
+          <p:cNvPr id="5" name="Agrupar 4">
+            <a:extLst>
+              <a:ext uri="{FF2B5EF4-FFF2-40B4-BE49-F238E27FC236}">
+                <a16:creationId xmlns:a16="http://schemas.microsoft.com/office/drawing/2014/main" id="{EA8FFE4E-BE54-4267-98B4-78DFF87310BF}"/>
+              </a:ext>
+            </a:extLst>
+          </p:cNvPr>
+          <p:cNvGrpSpPr/>
+          <p:nvPr/>
+        </p:nvGrpSpPr>
+        <p:grpSpPr>
+          <a:xfrm>
+            <a:off x="-246392" y="36254"/>
+            <a:ext cx="161800" cy="422289"/>
+            <a:chOff x="-246392" y="36254"/>
+            <a:chExt cx="161800" cy="422289"/>
+          </a:xfrm>
+        </p:grpSpPr>
+        <p:sp>
+          <p:nvSpPr>
+            <p:cNvPr id="6" name="Retângulo 5">
+              <a:extLst>
+                <a:ext uri="{FF2B5EF4-FFF2-40B4-BE49-F238E27FC236}">
+                  <a16:creationId xmlns:a16="http://schemas.microsoft.com/office/drawing/2014/main" id="{99D89A96-48FD-4E5F-A192-246491AF313C}"/>
+                </a:ext>
+              </a:extLst>
+            </p:cNvPr>
+            <p:cNvSpPr/>
+            <p:nvPr/>
+          </p:nvSpPr>
+          <p:spPr>
+            <a:xfrm>
+              <a:off x="-241692" y="36254"/>
+              <a:ext cx="157100" cy="185297"/>
+            </a:xfrm>
+            <a:prstGeom prst="rect">
+              <a:avLst/>
+            </a:prstGeom>
+            <a:solidFill>
+              <a:srgbClr val="B5DE00"/>
+            </a:solidFill>
+            <a:ln>
+              <a:noFill/>
+            </a:ln>
+          </p:spPr>
+          <p:style>
+            <a:lnRef idx="2">
+              <a:schemeClr val="accent1">
+                <a:shade val="50000"/>
+              </a:schemeClr>
+            </a:lnRef>
+            <a:fillRef idx="1">
+              <a:schemeClr val="accent1"/>
+            </a:fillRef>
+            <a:effectRef idx="0">
+              <a:schemeClr val="accent1"/>
+            </a:effectRef>
+            <a:fontRef idx="minor">
+              <a:schemeClr val="lt1"/>
+            </a:fontRef>
+          </p:style>
+          <p:txBody>
+            <a:bodyPr rtlCol="0" anchor="ctr"/>
+            <a:lstStyle/>
+            <a:p>
+              <a:pPr algn="ctr"/>
+              <a:endParaRPr lang="pt-BR"/>
+            </a:p>
+          </p:txBody>
+        </p:sp>
+        <p:sp>
+          <p:nvSpPr>
+            <p:cNvPr id="7" name="Retângulo 6">
+              <a:extLst>
+                <a:ext uri="{FF2B5EF4-FFF2-40B4-BE49-F238E27FC236}">
+                  <a16:creationId xmlns:a16="http://schemas.microsoft.com/office/drawing/2014/main" id="{E967C132-D0BE-470E-AB3D-FB9C2B3B2393}"/>
+                </a:ext>
+              </a:extLst>
+            </p:cNvPr>
+            <p:cNvSpPr/>
+            <p:nvPr/>
+          </p:nvSpPr>
+          <p:spPr>
+            <a:xfrm>
+              <a:off x="-246392" y="273246"/>
+              <a:ext cx="157100" cy="185297"/>
+            </a:xfrm>
+            <a:prstGeom prst="rect">
+              <a:avLst/>
+            </a:prstGeom>
+            <a:solidFill>
+              <a:srgbClr val="34977E"/>
+            </a:solidFill>
+            <a:ln>
+              <a:noFill/>
+            </a:ln>
+          </p:spPr>
+          <p:style>
+            <a:lnRef idx="2">
+              <a:schemeClr val="accent1">
+                <a:shade val="50000"/>
+              </a:schemeClr>
+            </a:lnRef>
+            <a:fillRef idx="1">
+              <a:schemeClr val="accent1"/>
+            </a:fillRef>
+            <a:effectRef idx="0">
+              <a:schemeClr val="accent1"/>
+            </a:effectRef>
+            <a:fontRef idx="minor">
+              <a:schemeClr val="lt1"/>
+            </a:fontRef>
+          </p:style>
+          <p:txBody>
+            <a:bodyPr rtlCol="0" anchor="ctr"/>
+            <a:lstStyle/>
+            <a:p>
+              <a:pPr algn="ctr"/>
+              <a:endParaRPr lang="pt-BR"/>
+            </a:p>
+          </p:txBody>
+        </p:sp>
+      </p:grpSp>
     </p:spTree>
     <p:extLst>
       <p:ext uri="{BB962C8B-B14F-4D97-AF65-F5344CB8AC3E}">
@@ -3876,7 +4426,7 @@
             <a:r>
               <a:rPr lang="pt-BR" sz="2400" dirty="0" err="1">
                 <a:solidFill>
-                  <a:srgbClr val="E89B26"/>
+                  <a:srgbClr val="B5DE00"/>
                 </a:solidFill>
                 <a:latin typeface="Tahoma" panose="020B0604030504040204" pitchFamily="34" charset="0"/>
                 <a:ea typeface="Tahoma" panose="020B0604030504040204" pitchFamily="34" charset="0"/>
@@ -3886,7 +4436,7 @@
             </a:r>
             <a:endParaRPr lang="pt-BR" sz="2400" dirty="0">
               <a:solidFill>
-                <a:srgbClr val="E89B26"/>
+                <a:srgbClr val="B5DE00"/>
               </a:solidFill>
               <a:latin typeface="Tahoma" panose="020B0604030504040204" pitchFamily="34" charset="0"/>
               <a:ea typeface="Tahoma" panose="020B0604030504040204" pitchFamily="34" charset="0"/>
@@ -3895,6 +4445,185 @@
           </a:p>
         </p:txBody>
       </p:sp>
+      <p:sp>
+        <p:nvSpPr>
+          <p:cNvPr id="3" name="Retângulo 2">
+            <a:extLst>
+              <a:ext uri="{FF2B5EF4-FFF2-40B4-BE49-F238E27FC236}">
+                <a16:creationId xmlns:a16="http://schemas.microsoft.com/office/drawing/2014/main" id="{8CAA7DA7-5674-4F4F-B09D-815A13C7737A}"/>
+              </a:ext>
+            </a:extLst>
+          </p:cNvPr>
+          <p:cNvSpPr/>
+          <p:nvPr/>
+        </p:nvSpPr>
+        <p:spPr>
+          <a:xfrm>
+            <a:off x="0" y="0"/>
+            <a:ext cx="1979612" cy="1979613"/>
+          </a:xfrm>
+          <a:prstGeom prst="rect">
+            <a:avLst/>
+          </a:prstGeom>
+          <a:noFill/>
+          <a:ln w="15875">
+            <a:solidFill>
+              <a:schemeClr val="bg1">
+                <a:lumMod val="65000"/>
+              </a:schemeClr>
+            </a:solidFill>
+          </a:ln>
+        </p:spPr>
+        <p:style>
+          <a:lnRef idx="2">
+            <a:schemeClr val="accent1">
+              <a:shade val="50000"/>
+            </a:schemeClr>
+          </a:lnRef>
+          <a:fillRef idx="1">
+            <a:schemeClr val="accent1"/>
+          </a:fillRef>
+          <a:effectRef idx="0">
+            <a:schemeClr val="accent1"/>
+          </a:effectRef>
+          <a:fontRef idx="minor">
+            <a:schemeClr val="lt1"/>
+          </a:fontRef>
+        </p:style>
+        <p:txBody>
+          <a:bodyPr rtlCol="0" anchor="ctr"/>
+          <a:lstStyle/>
+          <a:p>
+            <a:pPr algn="ctr"/>
+            <a:endParaRPr lang="pt-BR"/>
+          </a:p>
+        </p:txBody>
+      </p:sp>
+      <p:grpSp>
+        <p:nvGrpSpPr>
+          <p:cNvPr id="5" name="Agrupar 4">
+            <a:extLst>
+              <a:ext uri="{FF2B5EF4-FFF2-40B4-BE49-F238E27FC236}">
+                <a16:creationId xmlns:a16="http://schemas.microsoft.com/office/drawing/2014/main" id="{95F8CDA3-3D17-480C-BAA0-544656FEEA00}"/>
+              </a:ext>
+            </a:extLst>
+          </p:cNvPr>
+          <p:cNvGrpSpPr/>
+          <p:nvPr/>
+        </p:nvGrpSpPr>
+        <p:grpSpPr>
+          <a:xfrm>
+            <a:off x="-246392" y="36254"/>
+            <a:ext cx="161800" cy="422289"/>
+            <a:chOff x="-246392" y="36254"/>
+            <a:chExt cx="161800" cy="422289"/>
+          </a:xfrm>
+        </p:grpSpPr>
+        <p:sp>
+          <p:nvSpPr>
+            <p:cNvPr id="6" name="Retângulo 5">
+              <a:extLst>
+                <a:ext uri="{FF2B5EF4-FFF2-40B4-BE49-F238E27FC236}">
+                  <a16:creationId xmlns:a16="http://schemas.microsoft.com/office/drawing/2014/main" id="{C73A74EB-D21D-49A5-9181-E3EBD7A4EE8A}"/>
+                </a:ext>
+              </a:extLst>
+            </p:cNvPr>
+            <p:cNvSpPr/>
+            <p:nvPr/>
+          </p:nvSpPr>
+          <p:spPr>
+            <a:xfrm>
+              <a:off x="-241692" y="36254"/>
+              <a:ext cx="157100" cy="185297"/>
+            </a:xfrm>
+            <a:prstGeom prst="rect">
+              <a:avLst/>
+            </a:prstGeom>
+            <a:solidFill>
+              <a:srgbClr val="B5DE00"/>
+            </a:solidFill>
+            <a:ln>
+              <a:noFill/>
+            </a:ln>
+          </p:spPr>
+          <p:style>
+            <a:lnRef idx="2">
+              <a:schemeClr val="accent1">
+                <a:shade val="50000"/>
+              </a:schemeClr>
+            </a:lnRef>
+            <a:fillRef idx="1">
+              <a:schemeClr val="accent1"/>
+            </a:fillRef>
+            <a:effectRef idx="0">
+              <a:schemeClr val="accent1"/>
+            </a:effectRef>
+            <a:fontRef idx="minor">
+              <a:schemeClr val="lt1"/>
+            </a:fontRef>
+          </p:style>
+          <p:txBody>
+            <a:bodyPr rtlCol="0" anchor="ctr"/>
+            <a:lstStyle/>
+            <a:p>
+              <a:pPr algn="ctr"/>
+              <a:endParaRPr lang="pt-BR"/>
+            </a:p>
+          </p:txBody>
+        </p:sp>
+        <p:sp>
+          <p:nvSpPr>
+            <p:cNvPr id="7" name="Retângulo 6">
+              <a:extLst>
+                <a:ext uri="{FF2B5EF4-FFF2-40B4-BE49-F238E27FC236}">
+                  <a16:creationId xmlns:a16="http://schemas.microsoft.com/office/drawing/2014/main" id="{6DA47CFF-046A-4E8C-9A1F-5BF8B03C304A}"/>
+                </a:ext>
+              </a:extLst>
+            </p:cNvPr>
+            <p:cNvSpPr/>
+            <p:nvPr/>
+          </p:nvSpPr>
+          <p:spPr>
+            <a:xfrm>
+              <a:off x="-246392" y="273246"/>
+              <a:ext cx="157100" cy="185297"/>
+            </a:xfrm>
+            <a:prstGeom prst="rect">
+              <a:avLst/>
+            </a:prstGeom>
+            <a:solidFill>
+              <a:srgbClr val="34977E"/>
+            </a:solidFill>
+            <a:ln>
+              <a:noFill/>
+            </a:ln>
+          </p:spPr>
+          <p:style>
+            <a:lnRef idx="2">
+              <a:schemeClr val="accent1">
+                <a:shade val="50000"/>
+              </a:schemeClr>
+            </a:lnRef>
+            <a:fillRef idx="1">
+              <a:schemeClr val="accent1"/>
+            </a:fillRef>
+            <a:effectRef idx="0">
+              <a:schemeClr val="accent1"/>
+            </a:effectRef>
+            <a:fontRef idx="minor">
+              <a:schemeClr val="lt1"/>
+            </a:fontRef>
+          </p:style>
+          <p:txBody>
+            <a:bodyPr rtlCol="0" anchor="ctr"/>
+            <a:lstStyle/>
+            <a:p>
+              <a:pPr algn="ctr"/>
+              <a:endParaRPr lang="pt-BR"/>
+            </a:p>
+          </p:txBody>
+        </p:sp>
+      </p:grpSp>
     </p:spTree>
     <p:extLst>
       <p:ext uri="{BB962C8B-B14F-4D97-AF65-F5344CB8AC3E}">
@@ -3947,7 +4676,7 @@
         </p:nvSpPr>
         <p:spPr>
           <a:xfrm>
-            <a:off x="-1" y="758973"/>
+            <a:off x="-1" y="635863"/>
             <a:ext cx="1979613" cy="707886"/>
           </a:xfrm>
           <a:prstGeom prst="rect">
@@ -3965,7 +4694,7 @@
             <a:r>
               <a:rPr lang="pt-BR" sz="4000" dirty="0" err="1">
                 <a:solidFill>
-                  <a:srgbClr val="E89B26"/>
+                  <a:srgbClr val="B5DE00"/>
                 </a:solidFill>
                 <a:latin typeface="Tahoma" panose="020B0604030504040204" pitchFamily="34" charset="0"/>
                 <a:ea typeface="Tahoma" panose="020B0604030504040204" pitchFamily="34" charset="0"/>
@@ -3975,7 +4704,7 @@
             </a:r>
             <a:endParaRPr lang="pt-BR" sz="4000" dirty="0">
               <a:solidFill>
-                <a:srgbClr val="E89B26"/>
+                <a:srgbClr val="B5DE00"/>
               </a:solidFill>
               <a:latin typeface="Tahoma" panose="020B0604030504040204" pitchFamily="34" charset="0"/>
               <a:ea typeface="Tahoma" panose="020B0604030504040204" pitchFamily="34" charset="0"/>
@@ -3984,6 +4713,185 @@
           </a:p>
         </p:txBody>
       </p:sp>
+      <p:sp>
+        <p:nvSpPr>
+          <p:cNvPr id="3" name="Retângulo 2">
+            <a:extLst>
+              <a:ext uri="{FF2B5EF4-FFF2-40B4-BE49-F238E27FC236}">
+                <a16:creationId xmlns:a16="http://schemas.microsoft.com/office/drawing/2014/main" id="{2C286A72-09BF-40F0-8DB3-5422DBDB5C46}"/>
+              </a:ext>
+            </a:extLst>
+          </p:cNvPr>
+          <p:cNvSpPr/>
+          <p:nvPr/>
+        </p:nvSpPr>
+        <p:spPr>
+          <a:xfrm>
+            <a:off x="0" y="0"/>
+            <a:ext cx="1979612" cy="1979613"/>
+          </a:xfrm>
+          <a:prstGeom prst="rect">
+            <a:avLst/>
+          </a:prstGeom>
+          <a:noFill/>
+          <a:ln w="15875">
+            <a:solidFill>
+              <a:schemeClr val="bg1">
+                <a:lumMod val="65000"/>
+              </a:schemeClr>
+            </a:solidFill>
+          </a:ln>
+        </p:spPr>
+        <p:style>
+          <a:lnRef idx="2">
+            <a:schemeClr val="accent1">
+              <a:shade val="50000"/>
+            </a:schemeClr>
+          </a:lnRef>
+          <a:fillRef idx="1">
+            <a:schemeClr val="accent1"/>
+          </a:fillRef>
+          <a:effectRef idx="0">
+            <a:schemeClr val="accent1"/>
+          </a:effectRef>
+          <a:fontRef idx="minor">
+            <a:schemeClr val="lt1"/>
+          </a:fontRef>
+        </p:style>
+        <p:txBody>
+          <a:bodyPr rtlCol="0" anchor="ctr"/>
+          <a:lstStyle/>
+          <a:p>
+            <a:pPr algn="ctr"/>
+            <a:endParaRPr lang="pt-BR"/>
+          </a:p>
+        </p:txBody>
+      </p:sp>
+      <p:grpSp>
+        <p:nvGrpSpPr>
+          <p:cNvPr id="5" name="Agrupar 4">
+            <a:extLst>
+              <a:ext uri="{FF2B5EF4-FFF2-40B4-BE49-F238E27FC236}">
+                <a16:creationId xmlns:a16="http://schemas.microsoft.com/office/drawing/2014/main" id="{4A2BD3CA-3165-458E-BC43-CBF07822EC27}"/>
+              </a:ext>
+            </a:extLst>
+          </p:cNvPr>
+          <p:cNvGrpSpPr/>
+          <p:nvPr/>
+        </p:nvGrpSpPr>
+        <p:grpSpPr>
+          <a:xfrm>
+            <a:off x="-246392" y="36254"/>
+            <a:ext cx="161800" cy="422289"/>
+            <a:chOff x="-246392" y="36254"/>
+            <a:chExt cx="161800" cy="422289"/>
+          </a:xfrm>
+        </p:grpSpPr>
+        <p:sp>
+          <p:nvSpPr>
+            <p:cNvPr id="6" name="Retângulo 5">
+              <a:extLst>
+                <a:ext uri="{FF2B5EF4-FFF2-40B4-BE49-F238E27FC236}">
+                  <a16:creationId xmlns:a16="http://schemas.microsoft.com/office/drawing/2014/main" id="{DC420D35-083D-4467-AE53-B2EBF5BF73E1}"/>
+                </a:ext>
+              </a:extLst>
+            </p:cNvPr>
+            <p:cNvSpPr/>
+            <p:nvPr/>
+          </p:nvSpPr>
+          <p:spPr>
+            <a:xfrm>
+              <a:off x="-241692" y="36254"/>
+              <a:ext cx="157100" cy="185297"/>
+            </a:xfrm>
+            <a:prstGeom prst="rect">
+              <a:avLst/>
+            </a:prstGeom>
+            <a:solidFill>
+              <a:srgbClr val="B5DE00"/>
+            </a:solidFill>
+            <a:ln>
+              <a:noFill/>
+            </a:ln>
+          </p:spPr>
+          <p:style>
+            <a:lnRef idx="2">
+              <a:schemeClr val="accent1">
+                <a:shade val="50000"/>
+              </a:schemeClr>
+            </a:lnRef>
+            <a:fillRef idx="1">
+              <a:schemeClr val="accent1"/>
+            </a:fillRef>
+            <a:effectRef idx="0">
+              <a:schemeClr val="accent1"/>
+            </a:effectRef>
+            <a:fontRef idx="minor">
+              <a:schemeClr val="lt1"/>
+            </a:fontRef>
+          </p:style>
+          <p:txBody>
+            <a:bodyPr rtlCol="0" anchor="ctr"/>
+            <a:lstStyle/>
+            <a:p>
+              <a:pPr algn="ctr"/>
+              <a:endParaRPr lang="pt-BR"/>
+            </a:p>
+          </p:txBody>
+        </p:sp>
+        <p:sp>
+          <p:nvSpPr>
+            <p:cNvPr id="7" name="Retângulo 6">
+              <a:extLst>
+                <a:ext uri="{FF2B5EF4-FFF2-40B4-BE49-F238E27FC236}">
+                  <a16:creationId xmlns:a16="http://schemas.microsoft.com/office/drawing/2014/main" id="{CCFCE40B-B5D9-4567-83C2-104E4DD30E0A}"/>
+                </a:ext>
+              </a:extLst>
+            </p:cNvPr>
+            <p:cNvSpPr/>
+            <p:nvPr/>
+          </p:nvSpPr>
+          <p:spPr>
+            <a:xfrm>
+              <a:off x="-246392" y="273246"/>
+              <a:ext cx="157100" cy="185297"/>
+            </a:xfrm>
+            <a:prstGeom prst="rect">
+              <a:avLst/>
+            </a:prstGeom>
+            <a:solidFill>
+              <a:srgbClr val="34977E"/>
+            </a:solidFill>
+            <a:ln>
+              <a:noFill/>
+            </a:ln>
+          </p:spPr>
+          <p:style>
+            <a:lnRef idx="2">
+              <a:schemeClr val="accent1">
+                <a:shade val="50000"/>
+              </a:schemeClr>
+            </a:lnRef>
+            <a:fillRef idx="1">
+              <a:schemeClr val="accent1"/>
+            </a:fillRef>
+            <a:effectRef idx="0">
+              <a:schemeClr val="accent1"/>
+            </a:effectRef>
+            <a:fontRef idx="minor">
+              <a:schemeClr val="lt1"/>
+            </a:fontRef>
+          </p:style>
+          <p:txBody>
+            <a:bodyPr rtlCol="0" anchor="ctr"/>
+            <a:lstStyle/>
+            <a:p>
+              <a:pPr algn="ctr"/>
+              <a:endParaRPr lang="pt-BR"/>
+            </a:p>
+          </p:txBody>
+        </p:sp>
+      </p:grpSp>
     </p:spTree>
     <p:extLst>
       <p:ext uri="{BB962C8B-B14F-4D97-AF65-F5344CB8AC3E}">
@@ -4036,7 +4944,7 @@
         </p:nvSpPr>
         <p:spPr>
           <a:xfrm>
-            <a:off x="0" y="681119"/>
+            <a:off x="793" y="574307"/>
             <a:ext cx="1979613" cy="830997"/>
           </a:xfrm>
           <a:prstGeom prst="rect">
@@ -4050,6 +4958,7 @@
           </a:bodyPr>
           <a:lstStyle/>
           <a:p>
+            <a:pPr algn="ctr"/>
             <a:r>
               <a:rPr lang="pt-BR" sz="2400" dirty="0">
                 <a:solidFill>
@@ -4059,10 +4968,22 @@
                 <a:ea typeface="Tahoma" panose="020B0604030504040204" pitchFamily="34" charset="0"/>
                 <a:cs typeface="Tahoma" panose="020B0604030504040204" pitchFamily="34" charset="0"/>
               </a:rPr>
-              <a:t> Data</a:t>
-            </a:r>
-          </a:p>
-          <a:p>
+              <a:t> </a:t>
+            </a:r>
+            <a:r>
+              <a:rPr lang="pt-BR" sz="2400" dirty="0">
+                <a:solidFill>
+                  <a:srgbClr val="B5DE00"/>
+                </a:solidFill>
+                <a:latin typeface="Tahoma" panose="020B0604030504040204" pitchFamily="34" charset="0"/>
+                <a:ea typeface="Tahoma" panose="020B0604030504040204" pitchFamily="34" charset="0"/>
+                <a:cs typeface="Tahoma" panose="020B0604030504040204" pitchFamily="34" charset="0"/>
+              </a:rPr>
+              <a:t>Data</a:t>
+            </a:r>
+          </a:p>
+          <a:p>
+            <a:pPr algn="ctr"/>
             <a:r>
               <a:rPr lang="pt-BR" sz="2400" dirty="0">
                 <a:solidFill>
@@ -4072,11 +4993,201 @@
                 <a:ea typeface="Tahoma" panose="020B0604030504040204" pitchFamily="34" charset="0"/>
                 <a:cs typeface="Tahoma" panose="020B0604030504040204" pitchFamily="34" charset="0"/>
               </a:rPr>
-              <a:t> Science</a:t>
-            </a:r>
-          </a:p>
-        </p:txBody>
-      </p:sp>
+              <a:t> </a:t>
+            </a:r>
+            <a:r>
+              <a:rPr lang="pt-BR" sz="2400" dirty="0">
+                <a:solidFill>
+                  <a:srgbClr val="34977E"/>
+                </a:solidFill>
+                <a:latin typeface="Tahoma" panose="020B0604030504040204" pitchFamily="34" charset="0"/>
+                <a:ea typeface="Tahoma" panose="020B0604030504040204" pitchFamily="34" charset="0"/>
+                <a:cs typeface="Tahoma" panose="020B0604030504040204" pitchFamily="34" charset="0"/>
+              </a:rPr>
+              <a:t>Science</a:t>
+            </a:r>
+          </a:p>
+        </p:txBody>
+      </p:sp>
+      <p:sp>
+        <p:nvSpPr>
+          <p:cNvPr id="3" name="Retângulo 2">
+            <a:extLst>
+              <a:ext uri="{FF2B5EF4-FFF2-40B4-BE49-F238E27FC236}">
+                <a16:creationId xmlns:a16="http://schemas.microsoft.com/office/drawing/2014/main" id="{74A7C29D-F332-4D13-B29C-BC8CDDDD31F2}"/>
+              </a:ext>
+            </a:extLst>
+          </p:cNvPr>
+          <p:cNvSpPr/>
+          <p:nvPr/>
+        </p:nvSpPr>
+        <p:spPr>
+          <a:xfrm>
+            <a:off x="0" y="0"/>
+            <a:ext cx="1979612" cy="1979613"/>
+          </a:xfrm>
+          <a:prstGeom prst="rect">
+            <a:avLst/>
+          </a:prstGeom>
+          <a:noFill/>
+          <a:ln w="15875">
+            <a:solidFill>
+              <a:schemeClr val="bg1">
+                <a:lumMod val="65000"/>
+              </a:schemeClr>
+            </a:solidFill>
+          </a:ln>
+        </p:spPr>
+        <p:style>
+          <a:lnRef idx="2">
+            <a:schemeClr val="accent1">
+              <a:shade val="50000"/>
+            </a:schemeClr>
+          </a:lnRef>
+          <a:fillRef idx="1">
+            <a:schemeClr val="accent1"/>
+          </a:fillRef>
+          <a:effectRef idx="0">
+            <a:schemeClr val="accent1"/>
+          </a:effectRef>
+          <a:fontRef idx="minor">
+            <a:schemeClr val="lt1"/>
+          </a:fontRef>
+        </p:style>
+        <p:txBody>
+          <a:bodyPr rtlCol="0" anchor="ctr"/>
+          <a:lstStyle/>
+          <a:p>
+            <a:pPr algn="ctr"/>
+            <a:endParaRPr lang="pt-BR"/>
+          </a:p>
+        </p:txBody>
+      </p:sp>
+      <p:grpSp>
+        <p:nvGrpSpPr>
+          <p:cNvPr id="5" name="Agrupar 4">
+            <a:extLst>
+              <a:ext uri="{FF2B5EF4-FFF2-40B4-BE49-F238E27FC236}">
+                <a16:creationId xmlns:a16="http://schemas.microsoft.com/office/drawing/2014/main" id="{20D61A81-8AD5-48B9-9997-0DC2C43FA11A}"/>
+              </a:ext>
+            </a:extLst>
+          </p:cNvPr>
+          <p:cNvGrpSpPr/>
+          <p:nvPr/>
+        </p:nvGrpSpPr>
+        <p:grpSpPr>
+          <a:xfrm>
+            <a:off x="-246392" y="36254"/>
+            <a:ext cx="161800" cy="422289"/>
+            <a:chOff x="-246392" y="36254"/>
+            <a:chExt cx="161800" cy="422289"/>
+          </a:xfrm>
+        </p:grpSpPr>
+        <p:sp>
+          <p:nvSpPr>
+            <p:cNvPr id="6" name="Retângulo 5">
+              <a:extLst>
+                <a:ext uri="{FF2B5EF4-FFF2-40B4-BE49-F238E27FC236}">
+                  <a16:creationId xmlns:a16="http://schemas.microsoft.com/office/drawing/2014/main" id="{D23E42C2-6FEB-4E0C-95D5-830EC55023D9}"/>
+                </a:ext>
+              </a:extLst>
+            </p:cNvPr>
+            <p:cNvSpPr/>
+            <p:nvPr/>
+          </p:nvSpPr>
+          <p:spPr>
+            <a:xfrm>
+              <a:off x="-241692" y="36254"/>
+              <a:ext cx="157100" cy="185297"/>
+            </a:xfrm>
+            <a:prstGeom prst="rect">
+              <a:avLst/>
+            </a:prstGeom>
+            <a:solidFill>
+              <a:srgbClr val="B5DE00"/>
+            </a:solidFill>
+            <a:ln>
+              <a:noFill/>
+            </a:ln>
+          </p:spPr>
+          <p:style>
+            <a:lnRef idx="2">
+              <a:schemeClr val="accent1">
+                <a:shade val="50000"/>
+              </a:schemeClr>
+            </a:lnRef>
+            <a:fillRef idx="1">
+              <a:schemeClr val="accent1"/>
+            </a:fillRef>
+            <a:effectRef idx="0">
+              <a:schemeClr val="accent1"/>
+            </a:effectRef>
+            <a:fontRef idx="minor">
+              <a:schemeClr val="lt1"/>
+            </a:fontRef>
+          </p:style>
+          <p:txBody>
+            <a:bodyPr rtlCol="0" anchor="ctr"/>
+            <a:lstStyle/>
+            <a:p>
+              <a:pPr algn="ctr"/>
+              <a:endParaRPr lang="pt-BR"/>
+            </a:p>
+          </p:txBody>
+        </p:sp>
+        <p:sp>
+          <p:nvSpPr>
+            <p:cNvPr id="7" name="Retângulo 6">
+              <a:extLst>
+                <a:ext uri="{FF2B5EF4-FFF2-40B4-BE49-F238E27FC236}">
+                  <a16:creationId xmlns:a16="http://schemas.microsoft.com/office/drawing/2014/main" id="{CB66BA8E-5C18-48A3-BF5B-F3703F94F814}"/>
+                </a:ext>
+              </a:extLst>
+            </p:cNvPr>
+            <p:cNvSpPr/>
+            <p:nvPr/>
+          </p:nvSpPr>
+          <p:spPr>
+            <a:xfrm>
+              <a:off x="-246392" y="273246"/>
+              <a:ext cx="157100" cy="185297"/>
+            </a:xfrm>
+            <a:prstGeom prst="rect">
+              <a:avLst/>
+            </a:prstGeom>
+            <a:solidFill>
+              <a:srgbClr val="34977E"/>
+            </a:solidFill>
+            <a:ln>
+              <a:noFill/>
+            </a:ln>
+          </p:spPr>
+          <p:style>
+            <a:lnRef idx="2">
+              <a:schemeClr val="accent1">
+                <a:shade val="50000"/>
+              </a:schemeClr>
+            </a:lnRef>
+            <a:fillRef idx="1">
+              <a:schemeClr val="accent1"/>
+            </a:fillRef>
+            <a:effectRef idx="0">
+              <a:schemeClr val="accent1"/>
+            </a:effectRef>
+            <a:fontRef idx="minor">
+              <a:schemeClr val="lt1"/>
+            </a:fontRef>
+          </p:style>
+          <p:txBody>
+            <a:bodyPr rtlCol="0" anchor="ctr"/>
+            <a:lstStyle/>
+            <a:p>
+              <a:pPr algn="ctr"/>
+              <a:endParaRPr lang="pt-BR"/>
+            </a:p>
+          </p:txBody>
+        </p:sp>
+      </p:grpSp>
     </p:spTree>
     <p:extLst>
       <p:ext uri="{BB962C8B-B14F-4D97-AF65-F5344CB8AC3E}">
@@ -4129,7 +5240,7 @@
         </p:nvSpPr>
         <p:spPr>
           <a:xfrm>
-            <a:off x="-1" y="644865"/>
+            <a:off x="-1" y="575101"/>
             <a:ext cx="1979613" cy="830997"/>
           </a:xfrm>
           <a:prstGeom prst="rect">
@@ -4143,6 +5254,7 @@
           </a:bodyPr>
           <a:lstStyle/>
           <a:p>
+            <a:pPr algn="ctr"/>
             <a:r>
               <a:rPr lang="pt-BR" sz="2400" dirty="0">
                 <a:solidFill>
@@ -4157,7 +5269,7 @@
             <a:r>
               <a:rPr lang="pt-BR" sz="2400" dirty="0" err="1">
                 <a:solidFill>
-                  <a:schemeClr val="bg1"/>
+                  <a:srgbClr val="B5DE00"/>
                 </a:solidFill>
                 <a:latin typeface="Tahoma" panose="020B0604030504040204" pitchFamily="34" charset="0"/>
                 <a:ea typeface="Tahoma" panose="020B0604030504040204" pitchFamily="34" charset="0"/>
@@ -4167,7 +5279,7 @@
             </a:r>
             <a:endParaRPr lang="pt-BR" sz="2400" dirty="0">
               <a:solidFill>
-                <a:schemeClr val="bg1"/>
+                <a:srgbClr val="B5DE00"/>
               </a:solidFill>
               <a:latin typeface="Tahoma" panose="020B0604030504040204" pitchFamily="34" charset="0"/>
               <a:ea typeface="Tahoma" panose="020B0604030504040204" pitchFamily="34" charset="0"/>
@@ -4175,6 +5287,7 @@
             </a:endParaRPr>
           </a:p>
           <a:p>
+            <a:pPr algn="ctr"/>
             <a:r>
               <a:rPr lang="pt-BR" sz="2400" dirty="0">
                 <a:solidFill>
@@ -4184,12 +5297,23 @@
                 <a:ea typeface="Tahoma" panose="020B0604030504040204" pitchFamily="34" charset="0"/>
                 <a:cs typeface="Tahoma" panose="020B0604030504040204" pitchFamily="34" charset="0"/>
               </a:rPr>
-              <a:t> &amp; </a:t>
+              <a:t> </a:t>
+            </a:r>
+            <a:r>
+              <a:rPr lang="pt-BR" sz="2400" dirty="0">
+                <a:solidFill>
+                  <a:srgbClr val="34977E"/>
+                </a:solidFill>
+                <a:latin typeface="Tahoma" panose="020B0604030504040204" pitchFamily="34" charset="0"/>
+                <a:ea typeface="Tahoma" panose="020B0604030504040204" pitchFamily="34" charset="0"/>
+                <a:cs typeface="Tahoma" panose="020B0604030504040204" pitchFamily="34" charset="0"/>
+              </a:rPr>
+              <a:t>&amp; </a:t>
             </a:r>
             <a:r>
               <a:rPr lang="pt-BR" sz="2400" dirty="0" err="1">
                 <a:solidFill>
-                  <a:srgbClr val="E89B26"/>
+                  <a:srgbClr val="34977E"/>
                 </a:solidFill>
                 <a:latin typeface="Tahoma" panose="020B0604030504040204" pitchFamily="34" charset="0"/>
                 <a:ea typeface="Tahoma" panose="020B0604030504040204" pitchFamily="34" charset="0"/>
@@ -4199,7 +5323,7 @@
             </a:r>
             <a:endParaRPr lang="pt-BR" sz="2400" dirty="0">
               <a:solidFill>
-                <a:srgbClr val="E89B26"/>
+                <a:srgbClr val="34977E"/>
               </a:solidFill>
               <a:latin typeface="Tahoma" panose="020B0604030504040204" pitchFamily="34" charset="0"/>
               <a:ea typeface="Tahoma" panose="020B0604030504040204" pitchFamily="34" charset="0"/>
@@ -4208,6 +5332,185 @@
           </a:p>
         </p:txBody>
       </p:sp>
+      <p:sp>
+        <p:nvSpPr>
+          <p:cNvPr id="3" name="Retângulo 2">
+            <a:extLst>
+              <a:ext uri="{FF2B5EF4-FFF2-40B4-BE49-F238E27FC236}">
+                <a16:creationId xmlns:a16="http://schemas.microsoft.com/office/drawing/2014/main" id="{12D4FB0B-6491-4CBB-BC47-68D214663259}"/>
+              </a:ext>
+            </a:extLst>
+          </p:cNvPr>
+          <p:cNvSpPr/>
+          <p:nvPr/>
+        </p:nvSpPr>
+        <p:spPr>
+          <a:xfrm>
+            <a:off x="0" y="0"/>
+            <a:ext cx="1979612" cy="1979613"/>
+          </a:xfrm>
+          <a:prstGeom prst="rect">
+            <a:avLst/>
+          </a:prstGeom>
+          <a:noFill/>
+          <a:ln w="15875">
+            <a:solidFill>
+              <a:schemeClr val="bg1">
+                <a:lumMod val="65000"/>
+              </a:schemeClr>
+            </a:solidFill>
+          </a:ln>
+        </p:spPr>
+        <p:style>
+          <a:lnRef idx="2">
+            <a:schemeClr val="accent1">
+              <a:shade val="50000"/>
+            </a:schemeClr>
+          </a:lnRef>
+          <a:fillRef idx="1">
+            <a:schemeClr val="accent1"/>
+          </a:fillRef>
+          <a:effectRef idx="0">
+            <a:schemeClr val="accent1"/>
+          </a:effectRef>
+          <a:fontRef idx="minor">
+            <a:schemeClr val="lt1"/>
+          </a:fontRef>
+        </p:style>
+        <p:txBody>
+          <a:bodyPr rtlCol="0" anchor="ctr"/>
+          <a:lstStyle/>
+          <a:p>
+            <a:pPr algn="ctr"/>
+            <a:endParaRPr lang="pt-BR"/>
+          </a:p>
+        </p:txBody>
+      </p:sp>
+      <p:grpSp>
+        <p:nvGrpSpPr>
+          <p:cNvPr id="5" name="Agrupar 4">
+            <a:extLst>
+              <a:ext uri="{FF2B5EF4-FFF2-40B4-BE49-F238E27FC236}">
+                <a16:creationId xmlns:a16="http://schemas.microsoft.com/office/drawing/2014/main" id="{29AB1F1E-3A55-41EA-A79A-48A8DCB62801}"/>
+              </a:ext>
+            </a:extLst>
+          </p:cNvPr>
+          <p:cNvGrpSpPr/>
+          <p:nvPr/>
+        </p:nvGrpSpPr>
+        <p:grpSpPr>
+          <a:xfrm>
+            <a:off x="-246392" y="36254"/>
+            <a:ext cx="161800" cy="422289"/>
+            <a:chOff x="-246392" y="36254"/>
+            <a:chExt cx="161800" cy="422289"/>
+          </a:xfrm>
+        </p:grpSpPr>
+        <p:sp>
+          <p:nvSpPr>
+            <p:cNvPr id="6" name="Retângulo 5">
+              <a:extLst>
+                <a:ext uri="{FF2B5EF4-FFF2-40B4-BE49-F238E27FC236}">
+                  <a16:creationId xmlns:a16="http://schemas.microsoft.com/office/drawing/2014/main" id="{4B7A87EC-C1FE-49E4-9D21-8422702CC1DD}"/>
+                </a:ext>
+              </a:extLst>
+            </p:cNvPr>
+            <p:cNvSpPr/>
+            <p:nvPr/>
+          </p:nvSpPr>
+          <p:spPr>
+            <a:xfrm>
+              <a:off x="-241692" y="36254"/>
+              <a:ext cx="157100" cy="185297"/>
+            </a:xfrm>
+            <a:prstGeom prst="rect">
+              <a:avLst/>
+            </a:prstGeom>
+            <a:solidFill>
+              <a:srgbClr val="B5DE00"/>
+            </a:solidFill>
+            <a:ln>
+              <a:noFill/>
+            </a:ln>
+          </p:spPr>
+          <p:style>
+            <a:lnRef idx="2">
+              <a:schemeClr val="accent1">
+                <a:shade val="50000"/>
+              </a:schemeClr>
+            </a:lnRef>
+            <a:fillRef idx="1">
+              <a:schemeClr val="accent1"/>
+            </a:fillRef>
+            <a:effectRef idx="0">
+              <a:schemeClr val="accent1"/>
+            </a:effectRef>
+            <a:fontRef idx="minor">
+              <a:schemeClr val="lt1"/>
+            </a:fontRef>
+          </p:style>
+          <p:txBody>
+            <a:bodyPr rtlCol="0" anchor="ctr"/>
+            <a:lstStyle/>
+            <a:p>
+              <a:pPr algn="ctr"/>
+              <a:endParaRPr lang="pt-BR"/>
+            </a:p>
+          </p:txBody>
+        </p:sp>
+        <p:sp>
+          <p:nvSpPr>
+            <p:cNvPr id="7" name="Retângulo 6">
+              <a:extLst>
+                <a:ext uri="{FF2B5EF4-FFF2-40B4-BE49-F238E27FC236}">
+                  <a16:creationId xmlns:a16="http://schemas.microsoft.com/office/drawing/2014/main" id="{538B2BC2-75CB-49A5-9169-2A1F715EC3B8}"/>
+                </a:ext>
+              </a:extLst>
+            </p:cNvPr>
+            <p:cNvSpPr/>
+            <p:nvPr/>
+          </p:nvSpPr>
+          <p:spPr>
+            <a:xfrm>
+              <a:off x="-246392" y="273246"/>
+              <a:ext cx="157100" cy="185297"/>
+            </a:xfrm>
+            <a:prstGeom prst="rect">
+              <a:avLst/>
+            </a:prstGeom>
+            <a:solidFill>
+              <a:srgbClr val="34977E"/>
+            </a:solidFill>
+            <a:ln>
+              <a:noFill/>
+            </a:ln>
+          </p:spPr>
+          <p:style>
+            <a:lnRef idx="2">
+              <a:schemeClr val="accent1">
+                <a:shade val="50000"/>
+              </a:schemeClr>
+            </a:lnRef>
+            <a:fillRef idx="1">
+              <a:schemeClr val="accent1"/>
+            </a:fillRef>
+            <a:effectRef idx="0">
+              <a:schemeClr val="accent1"/>
+            </a:effectRef>
+            <a:fontRef idx="minor">
+              <a:schemeClr val="lt1"/>
+            </a:fontRef>
+          </p:style>
+          <p:txBody>
+            <a:bodyPr rtlCol="0" anchor="ctr"/>
+            <a:lstStyle/>
+            <a:p>
+              <a:pPr algn="ctr"/>
+              <a:endParaRPr lang="pt-BR"/>
+            </a:p>
+          </p:txBody>
+        </p:sp>
+      </p:grpSp>
     </p:spTree>
     <p:extLst>
       <p:ext uri="{BB962C8B-B14F-4D97-AF65-F5344CB8AC3E}">
@@ -4260,7 +5563,7 @@
         </p:nvSpPr>
         <p:spPr>
           <a:xfrm>
-            <a:off x="0" y="685148"/>
+            <a:off x="0" y="574307"/>
             <a:ext cx="1979613" cy="830997"/>
           </a:xfrm>
           <a:prstGeom prst="rect">
@@ -4274,6 +5577,7 @@
           </a:bodyPr>
           <a:lstStyle/>
           <a:p>
+            <a:pPr algn="ctr"/>
             <a:r>
               <a:rPr lang="pt-BR" sz="2400" dirty="0">
                 <a:solidFill>
@@ -4283,10 +5587,22 @@
                 <a:ea typeface="Tahoma" panose="020B0604030504040204" pitchFamily="34" charset="0"/>
                 <a:cs typeface="Tahoma" panose="020B0604030504040204" pitchFamily="34" charset="0"/>
               </a:rPr>
-              <a:t> Quantum</a:t>
-            </a:r>
-          </a:p>
-          <a:p>
+              <a:t> </a:t>
+            </a:r>
+            <a:r>
+              <a:rPr lang="pt-BR" sz="2400" dirty="0">
+                <a:solidFill>
+                  <a:srgbClr val="B5DE00"/>
+                </a:solidFill>
+                <a:latin typeface="Tahoma" panose="020B0604030504040204" pitchFamily="34" charset="0"/>
+                <a:ea typeface="Tahoma" panose="020B0604030504040204" pitchFamily="34" charset="0"/>
+                <a:cs typeface="Tahoma" panose="020B0604030504040204" pitchFamily="34" charset="0"/>
+              </a:rPr>
+              <a:t>Quantum</a:t>
+            </a:r>
+          </a:p>
+          <a:p>
+            <a:pPr algn="ctr"/>
             <a:r>
               <a:rPr lang="pt-BR" sz="2400" dirty="0">
                 <a:solidFill>
@@ -4301,7 +5617,7 @@
             <a:r>
               <a:rPr lang="pt-BR" sz="2400" dirty="0" err="1">
                 <a:solidFill>
-                  <a:srgbClr val="E89B26"/>
+                  <a:srgbClr val="34977E"/>
                 </a:solidFill>
                 <a:latin typeface="Tahoma" panose="020B0604030504040204" pitchFamily="34" charset="0"/>
                 <a:ea typeface="Tahoma" panose="020B0604030504040204" pitchFamily="34" charset="0"/>
@@ -4311,7 +5627,7 @@
             </a:r>
             <a:endParaRPr lang="pt-BR" sz="2400" dirty="0">
               <a:solidFill>
-                <a:srgbClr val="E89B26"/>
+                <a:srgbClr val="34977E"/>
               </a:solidFill>
               <a:latin typeface="Tahoma" panose="020B0604030504040204" pitchFamily="34" charset="0"/>
               <a:ea typeface="Tahoma" panose="020B0604030504040204" pitchFamily="34" charset="0"/>
@@ -4320,6 +5636,185 @@
           </a:p>
         </p:txBody>
       </p:sp>
+      <p:sp>
+        <p:nvSpPr>
+          <p:cNvPr id="3" name="Retângulo 2">
+            <a:extLst>
+              <a:ext uri="{FF2B5EF4-FFF2-40B4-BE49-F238E27FC236}">
+                <a16:creationId xmlns:a16="http://schemas.microsoft.com/office/drawing/2014/main" id="{3C030ADF-D9D4-4B0A-B155-F682443E5165}"/>
+              </a:ext>
+            </a:extLst>
+          </p:cNvPr>
+          <p:cNvSpPr/>
+          <p:nvPr/>
+        </p:nvSpPr>
+        <p:spPr>
+          <a:xfrm>
+            <a:off x="0" y="0"/>
+            <a:ext cx="1979612" cy="1979613"/>
+          </a:xfrm>
+          <a:prstGeom prst="rect">
+            <a:avLst/>
+          </a:prstGeom>
+          <a:noFill/>
+          <a:ln w="15875">
+            <a:solidFill>
+              <a:schemeClr val="bg1">
+                <a:lumMod val="65000"/>
+              </a:schemeClr>
+            </a:solidFill>
+          </a:ln>
+        </p:spPr>
+        <p:style>
+          <a:lnRef idx="2">
+            <a:schemeClr val="accent1">
+              <a:shade val="50000"/>
+            </a:schemeClr>
+          </a:lnRef>
+          <a:fillRef idx="1">
+            <a:schemeClr val="accent1"/>
+          </a:fillRef>
+          <a:effectRef idx="0">
+            <a:schemeClr val="accent1"/>
+          </a:effectRef>
+          <a:fontRef idx="minor">
+            <a:schemeClr val="lt1"/>
+          </a:fontRef>
+        </p:style>
+        <p:txBody>
+          <a:bodyPr rtlCol="0" anchor="ctr"/>
+          <a:lstStyle/>
+          <a:p>
+            <a:pPr algn="ctr"/>
+            <a:endParaRPr lang="pt-BR"/>
+          </a:p>
+        </p:txBody>
+      </p:sp>
+      <p:grpSp>
+        <p:nvGrpSpPr>
+          <p:cNvPr id="5" name="Agrupar 4">
+            <a:extLst>
+              <a:ext uri="{FF2B5EF4-FFF2-40B4-BE49-F238E27FC236}">
+                <a16:creationId xmlns:a16="http://schemas.microsoft.com/office/drawing/2014/main" id="{2D03CE55-8E43-42F4-8666-DC1A29871297}"/>
+              </a:ext>
+            </a:extLst>
+          </p:cNvPr>
+          <p:cNvGrpSpPr/>
+          <p:nvPr/>
+        </p:nvGrpSpPr>
+        <p:grpSpPr>
+          <a:xfrm>
+            <a:off x="-246392" y="36254"/>
+            <a:ext cx="161800" cy="422289"/>
+            <a:chOff x="-246392" y="36254"/>
+            <a:chExt cx="161800" cy="422289"/>
+          </a:xfrm>
+        </p:grpSpPr>
+        <p:sp>
+          <p:nvSpPr>
+            <p:cNvPr id="6" name="Retângulo 5">
+              <a:extLst>
+                <a:ext uri="{FF2B5EF4-FFF2-40B4-BE49-F238E27FC236}">
+                  <a16:creationId xmlns:a16="http://schemas.microsoft.com/office/drawing/2014/main" id="{AB58E100-6C79-4309-B08A-B0C99D8DCF5A}"/>
+                </a:ext>
+              </a:extLst>
+            </p:cNvPr>
+            <p:cNvSpPr/>
+            <p:nvPr/>
+          </p:nvSpPr>
+          <p:spPr>
+            <a:xfrm>
+              <a:off x="-241692" y="36254"/>
+              <a:ext cx="157100" cy="185297"/>
+            </a:xfrm>
+            <a:prstGeom prst="rect">
+              <a:avLst/>
+            </a:prstGeom>
+            <a:solidFill>
+              <a:srgbClr val="B5DE00"/>
+            </a:solidFill>
+            <a:ln>
+              <a:noFill/>
+            </a:ln>
+          </p:spPr>
+          <p:style>
+            <a:lnRef idx="2">
+              <a:schemeClr val="accent1">
+                <a:shade val="50000"/>
+              </a:schemeClr>
+            </a:lnRef>
+            <a:fillRef idx="1">
+              <a:schemeClr val="accent1"/>
+            </a:fillRef>
+            <a:effectRef idx="0">
+              <a:schemeClr val="accent1"/>
+            </a:effectRef>
+            <a:fontRef idx="minor">
+              <a:schemeClr val="lt1"/>
+            </a:fontRef>
+          </p:style>
+          <p:txBody>
+            <a:bodyPr rtlCol="0" anchor="ctr"/>
+            <a:lstStyle/>
+            <a:p>
+              <a:pPr algn="ctr"/>
+              <a:endParaRPr lang="pt-BR"/>
+            </a:p>
+          </p:txBody>
+        </p:sp>
+        <p:sp>
+          <p:nvSpPr>
+            <p:cNvPr id="7" name="Retângulo 6">
+              <a:extLst>
+                <a:ext uri="{FF2B5EF4-FFF2-40B4-BE49-F238E27FC236}">
+                  <a16:creationId xmlns:a16="http://schemas.microsoft.com/office/drawing/2014/main" id="{4CB5DC5F-AD89-477A-A8C2-3ADA0F6972FD}"/>
+                </a:ext>
+              </a:extLst>
+            </p:cNvPr>
+            <p:cNvSpPr/>
+            <p:nvPr/>
+          </p:nvSpPr>
+          <p:spPr>
+            <a:xfrm>
+              <a:off x="-246392" y="273246"/>
+              <a:ext cx="157100" cy="185297"/>
+            </a:xfrm>
+            <a:prstGeom prst="rect">
+              <a:avLst/>
+            </a:prstGeom>
+            <a:solidFill>
+              <a:srgbClr val="34977E"/>
+            </a:solidFill>
+            <a:ln>
+              <a:noFill/>
+            </a:ln>
+          </p:spPr>
+          <p:style>
+            <a:lnRef idx="2">
+              <a:schemeClr val="accent1">
+                <a:shade val="50000"/>
+              </a:schemeClr>
+            </a:lnRef>
+            <a:fillRef idx="1">
+              <a:schemeClr val="accent1"/>
+            </a:fillRef>
+            <a:effectRef idx="0">
+              <a:schemeClr val="accent1"/>
+            </a:effectRef>
+            <a:fontRef idx="minor">
+              <a:schemeClr val="lt1"/>
+            </a:fontRef>
+          </p:style>
+          <p:txBody>
+            <a:bodyPr rtlCol="0" anchor="ctr"/>
+            <a:lstStyle/>
+            <a:p>
+              <a:pPr algn="ctr"/>
+              <a:endParaRPr lang="pt-BR"/>
+            </a:p>
+          </p:txBody>
+        </p:sp>
+      </p:grpSp>
     </p:spTree>
     <p:extLst>
       <p:ext uri="{BB962C8B-B14F-4D97-AF65-F5344CB8AC3E}">
@@ -4372,7 +5867,7 @@
         </p:nvSpPr>
         <p:spPr>
           <a:xfrm>
-            <a:off x="0" y="644866"/>
+            <a:off x="-1" y="575101"/>
             <a:ext cx="1979613" cy="830997"/>
           </a:xfrm>
           <a:prstGeom prst="rect">
@@ -4386,6 +5881,7 @@
           </a:bodyPr>
           <a:lstStyle/>
           <a:p>
+            <a:pPr algn="ctr"/>
             <a:r>
               <a:rPr lang="pt-BR" sz="2400" dirty="0">
                 <a:solidFill>
@@ -4395,10 +5891,22 @@
                 <a:ea typeface="Tahoma" panose="020B0604030504040204" pitchFamily="34" charset="0"/>
                 <a:cs typeface="Tahoma" panose="020B0604030504040204" pitchFamily="34" charset="0"/>
               </a:rPr>
-              <a:t>  Software</a:t>
-            </a:r>
-          </a:p>
-          <a:p>
+              <a:t>  </a:t>
+            </a:r>
+            <a:r>
+              <a:rPr lang="pt-BR" sz="2400" dirty="0">
+                <a:solidFill>
+                  <a:srgbClr val="B5DE00"/>
+                </a:solidFill>
+                <a:latin typeface="Tahoma" panose="020B0604030504040204" pitchFamily="34" charset="0"/>
+                <a:ea typeface="Tahoma" panose="020B0604030504040204" pitchFamily="34" charset="0"/>
+                <a:cs typeface="Tahoma" panose="020B0604030504040204" pitchFamily="34" charset="0"/>
+              </a:rPr>
+              <a:t>Software</a:t>
+            </a:r>
+          </a:p>
+          <a:p>
+            <a:pPr algn="ctr"/>
             <a:r>
               <a:rPr lang="pt-BR" sz="2400" dirty="0">
                 <a:solidFill>
@@ -4413,7 +5921,7 @@
             <a:r>
               <a:rPr lang="pt-BR" sz="2400" dirty="0" err="1">
                 <a:solidFill>
-                  <a:srgbClr val="E89B26"/>
+                  <a:srgbClr val="34977E"/>
                 </a:solidFill>
                 <a:latin typeface="Tahoma" panose="020B0604030504040204" pitchFamily="34" charset="0"/>
                 <a:ea typeface="Tahoma" panose="020B0604030504040204" pitchFamily="34" charset="0"/>
@@ -4423,7 +5931,7 @@
             </a:r>
             <a:endParaRPr lang="pt-BR" sz="2400" dirty="0">
               <a:solidFill>
-                <a:srgbClr val="E89B26"/>
+                <a:srgbClr val="34977E"/>
               </a:solidFill>
               <a:latin typeface="Tahoma" panose="020B0604030504040204" pitchFamily="34" charset="0"/>
               <a:ea typeface="Tahoma" panose="020B0604030504040204" pitchFamily="34" charset="0"/>
@@ -4432,6 +5940,185 @@
           </a:p>
         </p:txBody>
       </p:sp>
+      <p:sp>
+        <p:nvSpPr>
+          <p:cNvPr id="3" name="Retângulo 2">
+            <a:extLst>
+              <a:ext uri="{FF2B5EF4-FFF2-40B4-BE49-F238E27FC236}">
+                <a16:creationId xmlns:a16="http://schemas.microsoft.com/office/drawing/2014/main" id="{641C25F2-E9F6-425B-9390-C60C774AC14C}"/>
+              </a:ext>
+            </a:extLst>
+          </p:cNvPr>
+          <p:cNvSpPr/>
+          <p:nvPr/>
+        </p:nvSpPr>
+        <p:spPr>
+          <a:xfrm>
+            <a:off x="0" y="0"/>
+            <a:ext cx="1979612" cy="1979613"/>
+          </a:xfrm>
+          <a:prstGeom prst="rect">
+            <a:avLst/>
+          </a:prstGeom>
+          <a:noFill/>
+          <a:ln w="15875">
+            <a:solidFill>
+              <a:schemeClr val="bg1">
+                <a:lumMod val="65000"/>
+              </a:schemeClr>
+            </a:solidFill>
+          </a:ln>
+        </p:spPr>
+        <p:style>
+          <a:lnRef idx="2">
+            <a:schemeClr val="accent1">
+              <a:shade val="50000"/>
+            </a:schemeClr>
+          </a:lnRef>
+          <a:fillRef idx="1">
+            <a:schemeClr val="accent1"/>
+          </a:fillRef>
+          <a:effectRef idx="0">
+            <a:schemeClr val="accent1"/>
+          </a:effectRef>
+          <a:fontRef idx="minor">
+            <a:schemeClr val="lt1"/>
+          </a:fontRef>
+        </p:style>
+        <p:txBody>
+          <a:bodyPr rtlCol="0" anchor="ctr"/>
+          <a:lstStyle/>
+          <a:p>
+            <a:pPr algn="ctr"/>
+            <a:endParaRPr lang="pt-BR"/>
+          </a:p>
+        </p:txBody>
+      </p:sp>
+      <p:grpSp>
+        <p:nvGrpSpPr>
+          <p:cNvPr id="5" name="Agrupar 4">
+            <a:extLst>
+              <a:ext uri="{FF2B5EF4-FFF2-40B4-BE49-F238E27FC236}">
+                <a16:creationId xmlns:a16="http://schemas.microsoft.com/office/drawing/2014/main" id="{454ED3D0-C988-463A-88A6-F1593334D3D5}"/>
+              </a:ext>
+            </a:extLst>
+          </p:cNvPr>
+          <p:cNvGrpSpPr/>
+          <p:nvPr/>
+        </p:nvGrpSpPr>
+        <p:grpSpPr>
+          <a:xfrm>
+            <a:off x="-246392" y="36254"/>
+            <a:ext cx="161800" cy="422289"/>
+            <a:chOff x="-246392" y="36254"/>
+            <a:chExt cx="161800" cy="422289"/>
+          </a:xfrm>
+        </p:grpSpPr>
+        <p:sp>
+          <p:nvSpPr>
+            <p:cNvPr id="6" name="Retângulo 5">
+              <a:extLst>
+                <a:ext uri="{FF2B5EF4-FFF2-40B4-BE49-F238E27FC236}">
+                  <a16:creationId xmlns:a16="http://schemas.microsoft.com/office/drawing/2014/main" id="{5FEE4092-1891-4912-9160-0F0CB9714208}"/>
+                </a:ext>
+              </a:extLst>
+            </p:cNvPr>
+            <p:cNvSpPr/>
+            <p:nvPr/>
+          </p:nvSpPr>
+          <p:spPr>
+            <a:xfrm>
+              <a:off x="-241692" y="36254"/>
+              <a:ext cx="157100" cy="185297"/>
+            </a:xfrm>
+            <a:prstGeom prst="rect">
+              <a:avLst/>
+            </a:prstGeom>
+            <a:solidFill>
+              <a:srgbClr val="B5DE00"/>
+            </a:solidFill>
+            <a:ln>
+              <a:noFill/>
+            </a:ln>
+          </p:spPr>
+          <p:style>
+            <a:lnRef idx="2">
+              <a:schemeClr val="accent1">
+                <a:shade val="50000"/>
+              </a:schemeClr>
+            </a:lnRef>
+            <a:fillRef idx="1">
+              <a:schemeClr val="accent1"/>
+            </a:fillRef>
+            <a:effectRef idx="0">
+              <a:schemeClr val="accent1"/>
+            </a:effectRef>
+            <a:fontRef idx="minor">
+              <a:schemeClr val="lt1"/>
+            </a:fontRef>
+          </p:style>
+          <p:txBody>
+            <a:bodyPr rtlCol="0" anchor="ctr"/>
+            <a:lstStyle/>
+            <a:p>
+              <a:pPr algn="ctr"/>
+              <a:endParaRPr lang="pt-BR"/>
+            </a:p>
+          </p:txBody>
+        </p:sp>
+        <p:sp>
+          <p:nvSpPr>
+            <p:cNvPr id="7" name="Retângulo 6">
+              <a:extLst>
+                <a:ext uri="{FF2B5EF4-FFF2-40B4-BE49-F238E27FC236}">
+                  <a16:creationId xmlns:a16="http://schemas.microsoft.com/office/drawing/2014/main" id="{EC6F7F15-9F0D-4E16-A901-F50F62941B38}"/>
+                </a:ext>
+              </a:extLst>
+            </p:cNvPr>
+            <p:cNvSpPr/>
+            <p:nvPr/>
+          </p:nvSpPr>
+          <p:spPr>
+            <a:xfrm>
+              <a:off x="-246392" y="273246"/>
+              <a:ext cx="157100" cy="185297"/>
+            </a:xfrm>
+            <a:prstGeom prst="rect">
+              <a:avLst/>
+            </a:prstGeom>
+            <a:solidFill>
+              <a:srgbClr val="34977E"/>
+            </a:solidFill>
+            <a:ln>
+              <a:noFill/>
+            </a:ln>
+          </p:spPr>
+          <p:style>
+            <a:lnRef idx="2">
+              <a:schemeClr val="accent1">
+                <a:shade val="50000"/>
+              </a:schemeClr>
+            </a:lnRef>
+            <a:fillRef idx="1">
+              <a:schemeClr val="accent1"/>
+            </a:fillRef>
+            <a:effectRef idx="0">
+              <a:schemeClr val="accent1"/>
+            </a:effectRef>
+            <a:fontRef idx="minor">
+              <a:schemeClr val="lt1"/>
+            </a:fontRef>
+          </p:style>
+          <p:txBody>
+            <a:bodyPr rtlCol="0" anchor="ctr"/>
+            <a:lstStyle/>
+            <a:p>
+              <a:pPr algn="ctr"/>
+              <a:endParaRPr lang="pt-BR"/>
+            </a:p>
+          </p:txBody>
+        </p:sp>
+      </p:grpSp>
     </p:spTree>
     <p:extLst>
       <p:ext uri="{BB962C8B-B14F-4D97-AF65-F5344CB8AC3E}">
@@ -4484,7 +6171,7 @@
         </p:nvSpPr>
         <p:spPr>
           <a:xfrm>
-            <a:off x="0" y="608838"/>
+            <a:off x="0" y="575101"/>
             <a:ext cx="1979613" cy="830997"/>
           </a:xfrm>
           <a:prstGeom prst="rect">
@@ -4498,6 +6185,7 @@
           </a:bodyPr>
           <a:lstStyle/>
           <a:p>
+            <a:pPr algn="ctr"/>
             <a:r>
               <a:rPr lang="pt-BR" sz="2400" dirty="0">
                 <a:solidFill>
@@ -4507,10 +6195,22 @@
                 <a:ea typeface="Tahoma" panose="020B0604030504040204" pitchFamily="34" charset="0"/>
                 <a:cs typeface="Tahoma" panose="020B0604030504040204" pitchFamily="34" charset="0"/>
               </a:rPr>
-              <a:t> Software</a:t>
-            </a:r>
-          </a:p>
-          <a:p>
+              <a:t> </a:t>
+            </a:r>
+            <a:r>
+              <a:rPr lang="pt-BR" sz="2400" dirty="0">
+                <a:solidFill>
+                  <a:srgbClr val="B5DE00"/>
+                </a:solidFill>
+                <a:latin typeface="Tahoma" panose="020B0604030504040204" pitchFamily="34" charset="0"/>
+                <a:ea typeface="Tahoma" panose="020B0604030504040204" pitchFamily="34" charset="0"/>
+                <a:cs typeface="Tahoma" panose="020B0604030504040204" pitchFamily="34" charset="0"/>
+              </a:rPr>
+              <a:t>Software</a:t>
+            </a:r>
+          </a:p>
+          <a:p>
+            <a:pPr algn="ctr"/>
             <a:r>
               <a:rPr lang="pt-BR" sz="2400" dirty="0">
                 <a:solidFill>
@@ -4525,7 +6225,7 @@
             <a:r>
               <a:rPr lang="pt-BR" sz="2400" dirty="0" err="1">
                 <a:solidFill>
-                  <a:srgbClr val="E89B26"/>
+                  <a:srgbClr val="34977E"/>
                 </a:solidFill>
                 <a:latin typeface="Tahoma" panose="020B0604030504040204" pitchFamily="34" charset="0"/>
                 <a:ea typeface="Tahoma" panose="020B0604030504040204" pitchFamily="34" charset="0"/>
@@ -4535,7 +6235,7 @@
             </a:r>
             <a:endParaRPr lang="pt-BR" sz="2400" dirty="0">
               <a:solidFill>
-                <a:srgbClr val="E89B26"/>
+                <a:srgbClr val="34977E"/>
               </a:solidFill>
               <a:latin typeface="Tahoma" panose="020B0604030504040204" pitchFamily="34" charset="0"/>
               <a:ea typeface="Tahoma" panose="020B0604030504040204" pitchFamily="34" charset="0"/>
@@ -4544,6 +6244,185 @@
           </a:p>
         </p:txBody>
       </p:sp>
+      <p:sp>
+        <p:nvSpPr>
+          <p:cNvPr id="3" name="Retângulo 2">
+            <a:extLst>
+              <a:ext uri="{FF2B5EF4-FFF2-40B4-BE49-F238E27FC236}">
+                <a16:creationId xmlns:a16="http://schemas.microsoft.com/office/drawing/2014/main" id="{5807823B-1F8B-460E-BE24-42E6818B7AEF}"/>
+              </a:ext>
+            </a:extLst>
+          </p:cNvPr>
+          <p:cNvSpPr/>
+          <p:nvPr/>
+        </p:nvSpPr>
+        <p:spPr>
+          <a:xfrm>
+            <a:off x="0" y="0"/>
+            <a:ext cx="1979612" cy="1979613"/>
+          </a:xfrm>
+          <a:prstGeom prst="rect">
+            <a:avLst/>
+          </a:prstGeom>
+          <a:noFill/>
+          <a:ln w="15875">
+            <a:solidFill>
+              <a:schemeClr val="bg1">
+                <a:lumMod val="65000"/>
+              </a:schemeClr>
+            </a:solidFill>
+          </a:ln>
+        </p:spPr>
+        <p:style>
+          <a:lnRef idx="2">
+            <a:schemeClr val="accent1">
+              <a:shade val="50000"/>
+            </a:schemeClr>
+          </a:lnRef>
+          <a:fillRef idx="1">
+            <a:schemeClr val="accent1"/>
+          </a:fillRef>
+          <a:effectRef idx="0">
+            <a:schemeClr val="accent1"/>
+          </a:effectRef>
+          <a:fontRef idx="minor">
+            <a:schemeClr val="lt1"/>
+          </a:fontRef>
+        </p:style>
+        <p:txBody>
+          <a:bodyPr rtlCol="0" anchor="ctr"/>
+          <a:lstStyle/>
+          <a:p>
+            <a:pPr algn="ctr"/>
+            <a:endParaRPr lang="pt-BR"/>
+          </a:p>
+        </p:txBody>
+      </p:sp>
+      <p:grpSp>
+        <p:nvGrpSpPr>
+          <p:cNvPr id="5" name="Agrupar 4">
+            <a:extLst>
+              <a:ext uri="{FF2B5EF4-FFF2-40B4-BE49-F238E27FC236}">
+                <a16:creationId xmlns:a16="http://schemas.microsoft.com/office/drawing/2014/main" id="{6ABA2BAF-3379-4317-A134-8B0435F5FAE1}"/>
+              </a:ext>
+            </a:extLst>
+          </p:cNvPr>
+          <p:cNvGrpSpPr/>
+          <p:nvPr/>
+        </p:nvGrpSpPr>
+        <p:grpSpPr>
+          <a:xfrm>
+            <a:off x="-246392" y="36254"/>
+            <a:ext cx="161800" cy="422289"/>
+            <a:chOff x="-246392" y="36254"/>
+            <a:chExt cx="161800" cy="422289"/>
+          </a:xfrm>
+        </p:grpSpPr>
+        <p:sp>
+          <p:nvSpPr>
+            <p:cNvPr id="6" name="Retângulo 5">
+              <a:extLst>
+                <a:ext uri="{FF2B5EF4-FFF2-40B4-BE49-F238E27FC236}">
+                  <a16:creationId xmlns:a16="http://schemas.microsoft.com/office/drawing/2014/main" id="{A8947149-B424-4D20-A080-E84FE6E53718}"/>
+                </a:ext>
+              </a:extLst>
+            </p:cNvPr>
+            <p:cNvSpPr/>
+            <p:nvPr/>
+          </p:nvSpPr>
+          <p:spPr>
+            <a:xfrm>
+              <a:off x="-241692" y="36254"/>
+              <a:ext cx="157100" cy="185297"/>
+            </a:xfrm>
+            <a:prstGeom prst="rect">
+              <a:avLst/>
+            </a:prstGeom>
+            <a:solidFill>
+              <a:srgbClr val="B5DE00"/>
+            </a:solidFill>
+            <a:ln>
+              <a:noFill/>
+            </a:ln>
+          </p:spPr>
+          <p:style>
+            <a:lnRef idx="2">
+              <a:schemeClr val="accent1">
+                <a:shade val="50000"/>
+              </a:schemeClr>
+            </a:lnRef>
+            <a:fillRef idx="1">
+              <a:schemeClr val="accent1"/>
+            </a:fillRef>
+            <a:effectRef idx="0">
+              <a:schemeClr val="accent1"/>
+            </a:effectRef>
+            <a:fontRef idx="minor">
+              <a:schemeClr val="lt1"/>
+            </a:fontRef>
+          </p:style>
+          <p:txBody>
+            <a:bodyPr rtlCol="0" anchor="ctr"/>
+            <a:lstStyle/>
+            <a:p>
+              <a:pPr algn="ctr"/>
+              <a:endParaRPr lang="pt-BR"/>
+            </a:p>
+          </p:txBody>
+        </p:sp>
+        <p:sp>
+          <p:nvSpPr>
+            <p:cNvPr id="7" name="Retângulo 6">
+              <a:extLst>
+                <a:ext uri="{FF2B5EF4-FFF2-40B4-BE49-F238E27FC236}">
+                  <a16:creationId xmlns:a16="http://schemas.microsoft.com/office/drawing/2014/main" id="{3F50E660-6D91-4A8D-AA04-E43BA92789F3}"/>
+                </a:ext>
+              </a:extLst>
+            </p:cNvPr>
+            <p:cNvSpPr/>
+            <p:nvPr/>
+          </p:nvSpPr>
+          <p:spPr>
+            <a:xfrm>
+              <a:off x="-246392" y="273246"/>
+              <a:ext cx="157100" cy="185297"/>
+            </a:xfrm>
+            <a:prstGeom prst="rect">
+              <a:avLst/>
+            </a:prstGeom>
+            <a:solidFill>
+              <a:srgbClr val="34977E"/>
+            </a:solidFill>
+            <a:ln>
+              <a:noFill/>
+            </a:ln>
+          </p:spPr>
+          <p:style>
+            <a:lnRef idx="2">
+              <a:schemeClr val="accent1">
+                <a:shade val="50000"/>
+              </a:schemeClr>
+            </a:lnRef>
+            <a:fillRef idx="1">
+              <a:schemeClr val="accent1"/>
+            </a:fillRef>
+            <a:effectRef idx="0">
+              <a:schemeClr val="accent1"/>
+            </a:effectRef>
+            <a:fontRef idx="minor">
+              <a:schemeClr val="lt1"/>
+            </a:fontRef>
+          </p:style>
+          <p:txBody>
+            <a:bodyPr rtlCol="0" anchor="ctr"/>
+            <a:lstStyle/>
+            <a:p>
+              <a:pPr algn="ctr"/>
+              <a:endParaRPr lang="pt-BR"/>
+            </a:p>
+          </p:txBody>
+        </p:sp>
+      </p:grpSp>
     </p:spTree>
     <p:extLst>
       <p:ext uri="{BB962C8B-B14F-4D97-AF65-F5344CB8AC3E}">
@@ -4614,7 +6493,7 @@
             <a:r>
               <a:rPr lang="pt-BR" sz="2400" dirty="0" err="1">
                 <a:solidFill>
-                  <a:srgbClr val="E89B26"/>
+                  <a:srgbClr val="B5DE00"/>
                 </a:solidFill>
                 <a:latin typeface="Tahoma" panose="020B0604030504040204" pitchFamily="34" charset="0"/>
                 <a:ea typeface="Tahoma" panose="020B0604030504040204" pitchFamily="34" charset="0"/>
@@ -4624,7 +6503,7 @@
             </a:r>
             <a:endParaRPr lang="pt-BR" sz="2400" dirty="0">
               <a:solidFill>
-                <a:srgbClr val="E89B26"/>
+                <a:srgbClr val="B5DE00"/>
               </a:solidFill>
               <a:latin typeface="Tahoma" panose="020B0604030504040204" pitchFamily="34" charset="0"/>
               <a:ea typeface="Tahoma" panose="020B0604030504040204" pitchFamily="34" charset="0"/>
@@ -4633,6 +6512,185 @@
           </a:p>
         </p:txBody>
       </p:sp>
+      <p:sp>
+        <p:nvSpPr>
+          <p:cNvPr id="3" name="Retângulo 2">
+            <a:extLst>
+              <a:ext uri="{FF2B5EF4-FFF2-40B4-BE49-F238E27FC236}">
+                <a16:creationId xmlns:a16="http://schemas.microsoft.com/office/drawing/2014/main" id="{1DCC2B7C-ADD0-42BE-8BCB-CDE8C63A77AE}"/>
+              </a:ext>
+            </a:extLst>
+          </p:cNvPr>
+          <p:cNvSpPr/>
+          <p:nvPr/>
+        </p:nvSpPr>
+        <p:spPr>
+          <a:xfrm>
+            <a:off x="0" y="0"/>
+            <a:ext cx="1979612" cy="1979613"/>
+          </a:xfrm>
+          <a:prstGeom prst="rect">
+            <a:avLst/>
+          </a:prstGeom>
+          <a:noFill/>
+          <a:ln w="15875">
+            <a:solidFill>
+              <a:schemeClr val="bg1">
+                <a:lumMod val="65000"/>
+              </a:schemeClr>
+            </a:solidFill>
+          </a:ln>
+        </p:spPr>
+        <p:style>
+          <a:lnRef idx="2">
+            <a:schemeClr val="accent1">
+              <a:shade val="50000"/>
+            </a:schemeClr>
+          </a:lnRef>
+          <a:fillRef idx="1">
+            <a:schemeClr val="accent1"/>
+          </a:fillRef>
+          <a:effectRef idx="0">
+            <a:schemeClr val="accent1"/>
+          </a:effectRef>
+          <a:fontRef idx="minor">
+            <a:schemeClr val="lt1"/>
+          </a:fontRef>
+        </p:style>
+        <p:txBody>
+          <a:bodyPr rtlCol="0" anchor="ctr"/>
+          <a:lstStyle/>
+          <a:p>
+            <a:pPr algn="ctr"/>
+            <a:endParaRPr lang="pt-BR"/>
+          </a:p>
+        </p:txBody>
+      </p:sp>
+      <p:grpSp>
+        <p:nvGrpSpPr>
+          <p:cNvPr id="5" name="Agrupar 4">
+            <a:extLst>
+              <a:ext uri="{FF2B5EF4-FFF2-40B4-BE49-F238E27FC236}">
+                <a16:creationId xmlns:a16="http://schemas.microsoft.com/office/drawing/2014/main" id="{A0522D5E-4009-4F3B-A7B9-6DC5845B2B65}"/>
+              </a:ext>
+            </a:extLst>
+          </p:cNvPr>
+          <p:cNvGrpSpPr/>
+          <p:nvPr/>
+        </p:nvGrpSpPr>
+        <p:grpSpPr>
+          <a:xfrm>
+            <a:off x="-246392" y="36254"/>
+            <a:ext cx="161800" cy="422289"/>
+            <a:chOff x="-246392" y="36254"/>
+            <a:chExt cx="161800" cy="422289"/>
+          </a:xfrm>
+        </p:grpSpPr>
+        <p:sp>
+          <p:nvSpPr>
+            <p:cNvPr id="6" name="Retângulo 5">
+              <a:extLst>
+                <a:ext uri="{FF2B5EF4-FFF2-40B4-BE49-F238E27FC236}">
+                  <a16:creationId xmlns:a16="http://schemas.microsoft.com/office/drawing/2014/main" id="{6FBB669D-47EB-4BCD-94DA-FE9FB442341C}"/>
+                </a:ext>
+              </a:extLst>
+            </p:cNvPr>
+            <p:cNvSpPr/>
+            <p:nvPr/>
+          </p:nvSpPr>
+          <p:spPr>
+            <a:xfrm>
+              <a:off x="-241692" y="36254"/>
+              <a:ext cx="157100" cy="185297"/>
+            </a:xfrm>
+            <a:prstGeom prst="rect">
+              <a:avLst/>
+            </a:prstGeom>
+            <a:solidFill>
+              <a:srgbClr val="B5DE00"/>
+            </a:solidFill>
+            <a:ln>
+              <a:noFill/>
+            </a:ln>
+          </p:spPr>
+          <p:style>
+            <a:lnRef idx="2">
+              <a:schemeClr val="accent1">
+                <a:shade val="50000"/>
+              </a:schemeClr>
+            </a:lnRef>
+            <a:fillRef idx="1">
+              <a:schemeClr val="accent1"/>
+            </a:fillRef>
+            <a:effectRef idx="0">
+              <a:schemeClr val="accent1"/>
+            </a:effectRef>
+            <a:fontRef idx="minor">
+              <a:schemeClr val="lt1"/>
+            </a:fontRef>
+          </p:style>
+          <p:txBody>
+            <a:bodyPr rtlCol="0" anchor="ctr"/>
+            <a:lstStyle/>
+            <a:p>
+              <a:pPr algn="ctr"/>
+              <a:endParaRPr lang="pt-BR"/>
+            </a:p>
+          </p:txBody>
+        </p:sp>
+        <p:sp>
+          <p:nvSpPr>
+            <p:cNvPr id="7" name="Retângulo 6">
+              <a:extLst>
+                <a:ext uri="{FF2B5EF4-FFF2-40B4-BE49-F238E27FC236}">
+                  <a16:creationId xmlns:a16="http://schemas.microsoft.com/office/drawing/2014/main" id="{DA7B543F-8FCE-4666-A7D8-93A24F4E75C0}"/>
+                </a:ext>
+              </a:extLst>
+            </p:cNvPr>
+            <p:cNvSpPr/>
+            <p:nvPr/>
+          </p:nvSpPr>
+          <p:spPr>
+            <a:xfrm>
+              <a:off x="-246392" y="273246"/>
+              <a:ext cx="157100" cy="185297"/>
+            </a:xfrm>
+            <a:prstGeom prst="rect">
+              <a:avLst/>
+            </a:prstGeom>
+            <a:solidFill>
+              <a:srgbClr val="34977E"/>
+            </a:solidFill>
+            <a:ln>
+              <a:noFill/>
+            </a:ln>
+          </p:spPr>
+          <p:style>
+            <a:lnRef idx="2">
+              <a:schemeClr val="accent1">
+                <a:shade val="50000"/>
+              </a:schemeClr>
+            </a:lnRef>
+            <a:fillRef idx="1">
+              <a:schemeClr val="accent1"/>
+            </a:fillRef>
+            <a:effectRef idx="0">
+              <a:schemeClr val="accent1"/>
+            </a:effectRef>
+            <a:fontRef idx="minor">
+              <a:schemeClr val="lt1"/>
+            </a:fontRef>
+          </p:style>
+          <p:txBody>
+            <a:bodyPr rtlCol="0" anchor="ctr"/>
+            <a:lstStyle/>
+            <a:p>
+              <a:pPr algn="ctr"/>
+              <a:endParaRPr lang="pt-BR"/>
+            </a:p>
+          </p:txBody>
+        </p:sp>
+      </p:grpSp>
     </p:spTree>
     <p:extLst>
       <p:ext uri="{BB962C8B-B14F-4D97-AF65-F5344CB8AC3E}">
@@ -4703,7 +6761,7 @@
             <a:r>
               <a:rPr lang="pt-BR" sz="2400" dirty="0" err="1">
                 <a:solidFill>
-                  <a:srgbClr val="E89B26"/>
+                  <a:srgbClr val="B5DE00"/>
                 </a:solidFill>
                 <a:latin typeface="Tahoma" panose="020B0604030504040204" pitchFamily="34" charset="0"/>
                 <a:ea typeface="Tahoma" panose="020B0604030504040204" pitchFamily="34" charset="0"/>
@@ -4713,7 +6771,7 @@
             </a:r>
             <a:endParaRPr lang="pt-BR" sz="2400" dirty="0">
               <a:solidFill>
-                <a:srgbClr val="E89B26"/>
+                <a:srgbClr val="B5DE00"/>
               </a:solidFill>
               <a:latin typeface="Tahoma" panose="020B0604030504040204" pitchFamily="34" charset="0"/>
               <a:ea typeface="Tahoma" panose="020B0604030504040204" pitchFamily="34" charset="0"/>
@@ -4722,6 +6780,185 @@
           </a:p>
         </p:txBody>
       </p:sp>
+      <p:sp>
+        <p:nvSpPr>
+          <p:cNvPr id="3" name="Retângulo 2">
+            <a:extLst>
+              <a:ext uri="{FF2B5EF4-FFF2-40B4-BE49-F238E27FC236}">
+                <a16:creationId xmlns:a16="http://schemas.microsoft.com/office/drawing/2014/main" id="{34EC900F-3C78-4838-9440-0C7EF0B00E58}"/>
+              </a:ext>
+            </a:extLst>
+          </p:cNvPr>
+          <p:cNvSpPr/>
+          <p:nvPr/>
+        </p:nvSpPr>
+        <p:spPr>
+          <a:xfrm>
+            <a:off x="0" y="0"/>
+            <a:ext cx="1979612" cy="1979613"/>
+          </a:xfrm>
+          <a:prstGeom prst="rect">
+            <a:avLst/>
+          </a:prstGeom>
+          <a:noFill/>
+          <a:ln w="15875">
+            <a:solidFill>
+              <a:schemeClr val="bg1">
+                <a:lumMod val="65000"/>
+              </a:schemeClr>
+            </a:solidFill>
+          </a:ln>
+        </p:spPr>
+        <p:style>
+          <a:lnRef idx="2">
+            <a:schemeClr val="accent1">
+              <a:shade val="50000"/>
+            </a:schemeClr>
+          </a:lnRef>
+          <a:fillRef idx="1">
+            <a:schemeClr val="accent1"/>
+          </a:fillRef>
+          <a:effectRef idx="0">
+            <a:schemeClr val="accent1"/>
+          </a:effectRef>
+          <a:fontRef idx="minor">
+            <a:schemeClr val="lt1"/>
+          </a:fontRef>
+        </p:style>
+        <p:txBody>
+          <a:bodyPr rtlCol="0" anchor="ctr"/>
+          <a:lstStyle/>
+          <a:p>
+            <a:pPr algn="ctr"/>
+            <a:endParaRPr lang="pt-BR"/>
+          </a:p>
+        </p:txBody>
+      </p:sp>
+      <p:grpSp>
+        <p:nvGrpSpPr>
+          <p:cNvPr id="5" name="Agrupar 4">
+            <a:extLst>
+              <a:ext uri="{FF2B5EF4-FFF2-40B4-BE49-F238E27FC236}">
+                <a16:creationId xmlns:a16="http://schemas.microsoft.com/office/drawing/2014/main" id="{BC7DCB1A-0434-4490-A7C5-65955BE16F42}"/>
+              </a:ext>
+            </a:extLst>
+          </p:cNvPr>
+          <p:cNvGrpSpPr/>
+          <p:nvPr/>
+        </p:nvGrpSpPr>
+        <p:grpSpPr>
+          <a:xfrm>
+            <a:off x="-246392" y="36254"/>
+            <a:ext cx="161800" cy="422289"/>
+            <a:chOff x="-246392" y="36254"/>
+            <a:chExt cx="161800" cy="422289"/>
+          </a:xfrm>
+        </p:grpSpPr>
+        <p:sp>
+          <p:nvSpPr>
+            <p:cNvPr id="6" name="Retângulo 5">
+              <a:extLst>
+                <a:ext uri="{FF2B5EF4-FFF2-40B4-BE49-F238E27FC236}">
+                  <a16:creationId xmlns:a16="http://schemas.microsoft.com/office/drawing/2014/main" id="{6B3A5869-3290-42BF-8110-F2AA140B6007}"/>
+                </a:ext>
+              </a:extLst>
+            </p:cNvPr>
+            <p:cNvSpPr/>
+            <p:nvPr/>
+          </p:nvSpPr>
+          <p:spPr>
+            <a:xfrm>
+              <a:off x="-241692" y="36254"/>
+              <a:ext cx="157100" cy="185297"/>
+            </a:xfrm>
+            <a:prstGeom prst="rect">
+              <a:avLst/>
+            </a:prstGeom>
+            <a:solidFill>
+              <a:srgbClr val="B5DE00"/>
+            </a:solidFill>
+            <a:ln>
+              <a:noFill/>
+            </a:ln>
+          </p:spPr>
+          <p:style>
+            <a:lnRef idx="2">
+              <a:schemeClr val="accent1">
+                <a:shade val="50000"/>
+              </a:schemeClr>
+            </a:lnRef>
+            <a:fillRef idx="1">
+              <a:schemeClr val="accent1"/>
+            </a:fillRef>
+            <a:effectRef idx="0">
+              <a:schemeClr val="accent1"/>
+            </a:effectRef>
+            <a:fontRef idx="minor">
+              <a:schemeClr val="lt1"/>
+            </a:fontRef>
+          </p:style>
+          <p:txBody>
+            <a:bodyPr rtlCol="0" anchor="ctr"/>
+            <a:lstStyle/>
+            <a:p>
+              <a:pPr algn="ctr"/>
+              <a:endParaRPr lang="pt-BR"/>
+            </a:p>
+          </p:txBody>
+        </p:sp>
+        <p:sp>
+          <p:nvSpPr>
+            <p:cNvPr id="7" name="Retângulo 6">
+              <a:extLst>
+                <a:ext uri="{FF2B5EF4-FFF2-40B4-BE49-F238E27FC236}">
+                  <a16:creationId xmlns:a16="http://schemas.microsoft.com/office/drawing/2014/main" id="{8D618934-34B5-4FA3-9C28-BA270D65E817}"/>
+                </a:ext>
+              </a:extLst>
+            </p:cNvPr>
+            <p:cNvSpPr/>
+            <p:nvPr/>
+          </p:nvSpPr>
+          <p:spPr>
+            <a:xfrm>
+              <a:off x="-246392" y="273246"/>
+              <a:ext cx="157100" cy="185297"/>
+            </a:xfrm>
+            <a:prstGeom prst="rect">
+              <a:avLst/>
+            </a:prstGeom>
+            <a:solidFill>
+              <a:srgbClr val="34977E"/>
+            </a:solidFill>
+            <a:ln>
+              <a:noFill/>
+            </a:ln>
+          </p:spPr>
+          <p:style>
+            <a:lnRef idx="2">
+              <a:schemeClr val="accent1">
+                <a:shade val="50000"/>
+              </a:schemeClr>
+            </a:lnRef>
+            <a:fillRef idx="1">
+              <a:schemeClr val="accent1"/>
+            </a:fillRef>
+            <a:effectRef idx="0">
+              <a:schemeClr val="accent1"/>
+            </a:effectRef>
+            <a:fontRef idx="minor">
+              <a:schemeClr val="lt1"/>
+            </a:fontRef>
+          </p:style>
+          <p:txBody>
+            <a:bodyPr rtlCol="0" anchor="ctr"/>
+            <a:lstStyle/>
+            <a:p>
+              <a:pPr algn="ctr"/>
+              <a:endParaRPr lang="pt-BR"/>
+            </a:p>
+          </p:txBody>
+        </p:sp>
+      </p:grpSp>
     </p:spTree>
     <p:extLst>
       <p:ext uri="{BB962C8B-B14F-4D97-AF65-F5344CB8AC3E}">
@@ -4792,7 +7029,7 @@
             <a:r>
               <a:rPr lang="pt-BR" sz="2400" dirty="0" err="1">
                 <a:solidFill>
-                  <a:srgbClr val="E89B26"/>
+                  <a:srgbClr val="B5DE00"/>
                 </a:solidFill>
                 <a:latin typeface="Tahoma" panose="020B0604030504040204" pitchFamily="34" charset="0"/>
                 <a:ea typeface="Tahoma" panose="020B0604030504040204" pitchFamily="34" charset="0"/>
@@ -4802,7 +7039,7 @@
             </a:r>
             <a:endParaRPr lang="pt-BR" sz="2400" dirty="0">
               <a:solidFill>
-                <a:srgbClr val="E89B26"/>
+                <a:srgbClr val="B5DE00"/>
               </a:solidFill>
               <a:latin typeface="Tahoma" panose="020B0604030504040204" pitchFamily="34" charset="0"/>
               <a:ea typeface="Tahoma" panose="020B0604030504040204" pitchFamily="34" charset="0"/>
@@ -4811,6 +7048,185 @@
           </a:p>
         </p:txBody>
       </p:sp>
+      <p:sp>
+        <p:nvSpPr>
+          <p:cNvPr id="3" name="Retângulo 2">
+            <a:extLst>
+              <a:ext uri="{FF2B5EF4-FFF2-40B4-BE49-F238E27FC236}">
+                <a16:creationId xmlns:a16="http://schemas.microsoft.com/office/drawing/2014/main" id="{A9FA8840-5F0C-47A3-949B-7D88321CF6A9}"/>
+              </a:ext>
+            </a:extLst>
+          </p:cNvPr>
+          <p:cNvSpPr/>
+          <p:nvPr/>
+        </p:nvSpPr>
+        <p:spPr>
+          <a:xfrm>
+            <a:off x="0" y="0"/>
+            <a:ext cx="1979612" cy="1979613"/>
+          </a:xfrm>
+          <a:prstGeom prst="rect">
+            <a:avLst/>
+          </a:prstGeom>
+          <a:noFill/>
+          <a:ln w="15875">
+            <a:solidFill>
+              <a:schemeClr val="bg1">
+                <a:lumMod val="65000"/>
+              </a:schemeClr>
+            </a:solidFill>
+          </a:ln>
+        </p:spPr>
+        <p:style>
+          <a:lnRef idx="2">
+            <a:schemeClr val="accent1">
+              <a:shade val="50000"/>
+            </a:schemeClr>
+          </a:lnRef>
+          <a:fillRef idx="1">
+            <a:schemeClr val="accent1"/>
+          </a:fillRef>
+          <a:effectRef idx="0">
+            <a:schemeClr val="accent1"/>
+          </a:effectRef>
+          <a:fontRef idx="minor">
+            <a:schemeClr val="lt1"/>
+          </a:fontRef>
+        </p:style>
+        <p:txBody>
+          <a:bodyPr rtlCol="0" anchor="ctr"/>
+          <a:lstStyle/>
+          <a:p>
+            <a:pPr algn="ctr"/>
+            <a:endParaRPr lang="pt-BR"/>
+          </a:p>
+        </p:txBody>
+      </p:sp>
+      <p:grpSp>
+        <p:nvGrpSpPr>
+          <p:cNvPr id="5" name="Agrupar 4">
+            <a:extLst>
+              <a:ext uri="{FF2B5EF4-FFF2-40B4-BE49-F238E27FC236}">
+                <a16:creationId xmlns:a16="http://schemas.microsoft.com/office/drawing/2014/main" id="{4498F74C-8403-4B30-922B-57B8A8913C60}"/>
+              </a:ext>
+            </a:extLst>
+          </p:cNvPr>
+          <p:cNvGrpSpPr/>
+          <p:nvPr/>
+        </p:nvGrpSpPr>
+        <p:grpSpPr>
+          <a:xfrm>
+            <a:off x="-246392" y="36254"/>
+            <a:ext cx="161800" cy="422289"/>
+            <a:chOff x="-246392" y="36254"/>
+            <a:chExt cx="161800" cy="422289"/>
+          </a:xfrm>
+        </p:grpSpPr>
+        <p:sp>
+          <p:nvSpPr>
+            <p:cNvPr id="6" name="Retângulo 5">
+              <a:extLst>
+                <a:ext uri="{FF2B5EF4-FFF2-40B4-BE49-F238E27FC236}">
+                  <a16:creationId xmlns:a16="http://schemas.microsoft.com/office/drawing/2014/main" id="{38DAFD0D-AA3F-45AF-A020-4171D68152E1}"/>
+                </a:ext>
+              </a:extLst>
+            </p:cNvPr>
+            <p:cNvSpPr/>
+            <p:nvPr/>
+          </p:nvSpPr>
+          <p:spPr>
+            <a:xfrm>
+              <a:off x="-241692" y="36254"/>
+              <a:ext cx="157100" cy="185297"/>
+            </a:xfrm>
+            <a:prstGeom prst="rect">
+              <a:avLst/>
+            </a:prstGeom>
+            <a:solidFill>
+              <a:srgbClr val="B5DE00"/>
+            </a:solidFill>
+            <a:ln>
+              <a:noFill/>
+            </a:ln>
+          </p:spPr>
+          <p:style>
+            <a:lnRef idx="2">
+              <a:schemeClr val="accent1">
+                <a:shade val="50000"/>
+              </a:schemeClr>
+            </a:lnRef>
+            <a:fillRef idx="1">
+              <a:schemeClr val="accent1"/>
+            </a:fillRef>
+            <a:effectRef idx="0">
+              <a:schemeClr val="accent1"/>
+            </a:effectRef>
+            <a:fontRef idx="minor">
+              <a:schemeClr val="lt1"/>
+            </a:fontRef>
+          </p:style>
+          <p:txBody>
+            <a:bodyPr rtlCol="0" anchor="ctr"/>
+            <a:lstStyle/>
+            <a:p>
+              <a:pPr algn="ctr"/>
+              <a:endParaRPr lang="pt-BR"/>
+            </a:p>
+          </p:txBody>
+        </p:sp>
+        <p:sp>
+          <p:nvSpPr>
+            <p:cNvPr id="7" name="Retângulo 6">
+              <a:extLst>
+                <a:ext uri="{FF2B5EF4-FFF2-40B4-BE49-F238E27FC236}">
+                  <a16:creationId xmlns:a16="http://schemas.microsoft.com/office/drawing/2014/main" id="{B04F8F2C-931B-472A-8242-B9F2B69F552A}"/>
+                </a:ext>
+              </a:extLst>
+            </p:cNvPr>
+            <p:cNvSpPr/>
+            <p:nvPr/>
+          </p:nvSpPr>
+          <p:spPr>
+            <a:xfrm>
+              <a:off x="-246392" y="273246"/>
+              <a:ext cx="157100" cy="185297"/>
+            </a:xfrm>
+            <a:prstGeom prst="rect">
+              <a:avLst/>
+            </a:prstGeom>
+            <a:solidFill>
+              <a:srgbClr val="34977E"/>
+            </a:solidFill>
+            <a:ln>
+              <a:noFill/>
+            </a:ln>
+          </p:spPr>
+          <p:style>
+            <a:lnRef idx="2">
+              <a:schemeClr val="accent1">
+                <a:shade val="50000"/>
+              </a:schemeClr>
+            </a:lnRef>
+            <a:fillRef idx="1">
+              <a:schemeClr val="accent1"/>
+            </a:fillRef>
+            <a:effectRef idx="0">
+              <a:schemeClr val="accent1"/>
+            </a:effectRef>
+            <a:fontRef idx="minor">
+              <a:schemeClr val="lt1"/>
+            </a:fontRef>
+          </p:style>
+          <p:txBody>
+            <a:bodyPr rtlCol="0" anchor="ctr"/>
+            <a:lstStyle/>
+            <a:p>
+              <a:pPr algn="ctr"/>
+              <a:endParaRPr lang="pt-BR"/>
+            </a:p>
+          </p:txBody>
+        </p:sp>
+      </p:grpSp>
     </p:spTree>
     <p:extLst>
       <p:ext uri="{BB962C8B-B14F-4D97-AF65-F5344CB8AC3E}">
@@ -4863,8 +7279,8 @@
         </p:nvSpPr>
         <p:spPr>
           <a:xfrm>
-            <a:off x="-1" y="758973"/>
-            <a:ext cx="1979613" cy="461665"/>
+            <a:off x="-1" y="574307"/>
+            <a:ext cx="1979613" cy="830997"/>
           </a:xfrm>
           <a:prstGeom prst="rect">
             <a:avLst/>
@@ -4879,9 +7295,23 @@
           <a:p>
             <a:pPr algn="ctr"/>
             <a:r>
+              <a:rPr lang="pt-BR" sz="2400" dirty="0">
+                <a:solidFill>
+                  <a:srgbClr val="B5DE00"/>
+                </a:solidFill>
+                <a:latin typeface="Tahoma" panose="020B0604030504040204" pitchFamily="34" charset="0"/>
+                <a:ea typeface="Tahoma" panose="020B0604030504040204" pitchFamily="34" charset="0"/>
+                <a:cs typeface="Tahoma" panose="020B0604030504040204" pitchFamily="34" charset="0"/>
+              </a:rPr>
+              <a:t>Data &amp;</a:t>
+            </a:r>
+          </a:p>
+          <a:p>
+            <a:pPr algn="ctr"/>
+            <a:r>
               <a:rPr lang="pt-BR" sz="2400" dirty="0" err="1">
                 <a:solidFill>
-                  <a:srgbClr val="E89B26"/>
+                  <a:srgbClr val="34977E"/>
                 </a:solidFill>
                 <a:latin typeface="Tahoma" panose="020B0604030504040204" pitchFamily="34" charset="0"/>
                 <a:ea typeface="Tahoma" panose="020B0604030504040204" pitchFamily="34" charset="0"/>
@@ -4891,7 +7321,7 @@
             </a:r>
             <a:endParaRPr lang="pt-BR" sz="2400" dirty="0">
               <a:solidFill>
-                <a:srgbClr val="E89B26"/>
+                <a:srgbClr val="34977E"/>
               </a:solidFill>
               <a:latin typeface="Tahoma" panose="020B0604030504040204" pitchFamily="34" charset="0"/>
               <a:ea typeface="Tahoma" panose="020B0604030504040204" pitchFamily="34" charset="0"/>
@@ -4900,6 +7330,185 @@
           </a:p>
         </p:txBody>
       </p:sp>
+      <p:sp>
+        <p:nvSpPr>
+          <p:cNvPr id="5" name="Retângulo 4">
+            <a:extLst>
+              <a:ext uri="{FF2B5EF4-FFF2-40B4-BE49-F238E27FC236}">
+                <a16:creationId xmlns:a16="http://schemas.microsoft.com/office/drawing/2014/main" id="{C1DD6101-5A66-4792-9D59-8601EAB59F00}"/>
+              </a:ext>
+            </a:extLst>
+          </p:cNvPr>
+          <p:cNvSpPr/>
+          <p:nvPr/>
+        </p:nvSpPr>
+        <p:spPr>
+          <a:xfrm>
+            <a:off x="0" y="0"/>
+            <a:ext cx="1979612" cy="1979613"/>
+          </a:xfrm>
+          <a:prstGeom prst="rect">
+            <a:avLst/>
+          </a:prstGeom>
+          <a:noFill/>
+          <a:ln w="15875">
+            <a:solidFill>
+              <a:schemeClr val="bg1">
+                <a:lumMod val="65000"/>
+              </a:schemeClr>
+            </a:solidFill>
+          </a:ln>
+        </p:spPr>
+        <p:style>
+          <a:lnRef idx="2">
+            <a:schemeClr val="accent1">
+              <a:shade val="50000"/>
+            </a:schemeClr>
+          </a:lnRef>
+          <a:fillRef idx="1">
+            <a:schemeClr val="accent1"/>
+          </a:fillRef>
+          <a:effectRef idx="0">
+            <a:schemeClr val="accent1"/>
+          </a:effectRef>
+          <a:fontRef idx="minor">
+            <a:schemeClr val="lt1"/>
+          </a:fontRef>
+        </p:style>
+        <p:txBody>
+          <a:bodyPr rtlCol="0" anchor="ctr"/>
+          <a:lstStyle/>
+          <a:p>
+            <a:pPr algn="ctr"/>
+            <a:endParaRPr lang="pt-BR"/>
+          </a:p>
+        </p:txBody>
+      </p:sp>
+      <p:grpSp>
+        <p:nvGrpSpPr>
+          <p:cNvPr id="6" name="Agrupar 5">
+            <a:extLst>
+              <a:ext uri="{FF2B5EF4-FFF2-40B4-BE49-F238E27FC236}">
+                <a16:creationId xmlns:a16="http://schemas.microsoft.com/office/drawing/2014/main" id="{C3107B12-CB82-46EE-9C86-7358419BA15D}"/>
+              </a:ext>
+            </a:extLst>
+          </p:cNvPr>
+          <p:cNvGrpSpPr/>
+          <p:nvPr/>
+        </p:nvGrpSpPr>
+        <p:grpSpPr>
+          <a:xfrm>
+            <a:off x="-246392" y="36254"/>
+            <a:ext cx="161800" cy="422289"/>
+            <a:chOff x="-246392" y="36254"/>
+            <a:chExt cx="161800" cy="422289"/>
+          </a:xfrm>
+        </p:grpSpPr>
+        <p:sp>
+          <p:nvSpPr>
+            <p:cNvPr id="7" name="Retângulo 6">
+              <a:extLst>
+                <a:ext uri="{FF2B5EF4-FFF2-40B4-BE49-F238E27FC236}">
+                  <a16:creationId xmlns:a16="http://schemas.microsoft.com/office/drawing/2014/main" id="{756BD13E-F482-4073-91A2-4DAF4394489B}"/>
+                </a:ext>
+              </a:extLst>
+            </p:cNvPr>
+            <p:cNvSpPr/>
+            <p:nvPr/>
+          </p:nvSpPr>
+          <p:spPr>
+            <a:xfrm>
+              <a:off x="-241692" y="36254"/>
+              <a:ext cx="157100" cy="185297"/>
+            </a:xfrm>
+            <a:prstGeom prst="rect">
+              <a:avLst/>
+            </a:prstGeom>
+            <a:solidFill>
+              <a:srgbClr val="B5DE00"/>
+            </a:solidFill>
+            <a:ln>
+              <a:noFill/>
+            </a:ln>
+          </p:spPr>
+          <p:style>
+            <a:lnRef idx="2">
+              <a:schemeClr val="accent1">
+                <a:shade val="50000"/>
+              </a:schemeClr>
+            </a:lnRef>
+            <a:fillRef idx="1">
+              <a:schemeClr val="accent1"/>
+            </a:fillRef>
+            <a:effectRef idx="0">
+              <a:schemeClr val="accent1"/>
+            </a:effectRef>
+            <a:fontRef idx="minor">
+              <a:schemeClr val="lt1"/>
+            </a:fontRef>
+          </p:style>
+          <p:txBody>
+            <a:bodyPr rtlCol="0" anchor="ctr"/>
+            <a:lstStyle/>
+            <a:p>
+              <a:pPr algn="ctr"/>
+              <a:endParaRPr lang="pt-BR"/>
+            </a:p>
+          </p:txBody>
+        </p:sp>
+        <p:sp>
+          <p:nvSpPr>
+            <p:cNvPr id="8" name="Retângulo 7">
+              <a:extLst>
+                <a:ext uri="{FF2B5EF4-FFF2-40B4-BE49-F238E27FC236}">
+                  <a16:creationId xmlns:a16="http://schemas.microsoft.com/office/drawing/2014/main" id="{E519286F-36D8-4CA0-AEB4-784482E98262}"/>
+                </a:ext>
+              </a:extLst>
+            </p:cNvPr>
+            <p:cNvSpPr/>
+            <p:nvPr/>
+          </p:nvSpPr>
+          <p:spPr>
+            <a:xfrm>
+              <a:off x="-246392" y="273246"/>
+              <a:ext cx="157100" cy="185297"/>
+            </a:xfrm>
+            <a:prstGeom prst="rect">
+              <a:avLst/>
+            </a:prstGeom>
+            <a:solidFill>
+              <a:srgbClr val="34977E"/>
+            </a:solidFill>
+            <a:ln>
+              <a:noFill/>
+            </a:ln>
+          </p:spPr>
+          <p:style>
+            <a:lnRef idx="2">
+              <a:schemeClr val="accent1">
+                <a:shade val="50000"/>
+              </a:schemeClr>
+            </a:lnRef>
+            <a:fillRef idx="1">
+              <a:schemeClr val="accent1"/>
+            </a:fillRef>
+            <a:effectRef idx="0">
+              <a:schemeClr val="accent1"/>
+            </a:effectRef>
+            <a:fontRef idx="minor">
+              <a:schemeClr val="lt1"/>
+            </a:fontRef>
+          </p:style>
+          <p:txBody>
+            <a:bodyPr rtlCol="0" anchor="ctr"/>
+            <a:lstStyle/>
+            <a:p>
+              <a:pPr algn="ctr"/>
+              <a:endParaRPr lang="pt-BR"/>
+            </a:p>
+          </p:txBody>
+        </p:sp>
+      </p:grpSp>
     </p:spTree>
     <p:extLst>
       <p:ext uri="{BB962C8B-B14F-4D97-AF65-F5344CB8AC3E}">
@@ -4970,7 +7579,7 @@
             <a:r>
               <a:rPr lang="pt-BR" sz="2400" dirty="0">
                 <a:solidFill>
-                  <a:srgbClr val="E89B26"/>
+                  <a:srgbClr val="B5DE00"/>
                 </a:solidFill>
                 <a:latin typeface="Tahoma" panose="020B0604030504040204" pitchFamily="34" charset="0"/>
                 <a:ea typeface="Tahoma" panose="020B0604030504040204" pitchFamily="34" charset="0"/>
@@ -4981,6 +7590,185 @@
           </a:p>
         </p:txBody>
       </p:sp>
+      <p:sp>
+        <p:nvSpPr>
+          <p:cNvPr id="6" name="Retângulo 5">
+            <a:extLst>
+              <a:ext uri="{FF2B5EF4-FFF2-40B4-BE49-F238E27FC236}">
+                <a16:creationId xmlns:a16="http://schemas.microsoft.com/office/drawing/2014/main" id="{D455C981-6C90-49A5-A4F0-99435347731C}"/>
+              </a:ext>
+            </a:extLst>
+          </p:cNvPr>
+          <p:cNvSpPr/>
+          <p:nvPr/>
+        </p:nvSpPr>
+        <p:spPr>
+          <a:xfrm>
+            <a:off x="0" y="0"/>
+            <a:ext cx="1979612" cy="1979613"/>
+          </a:xfrm>
+          <a:prstGeom prst="rect">
+            <a:avLst/>
+          </a:prstGeom>
+          <a:noFill/>
+          <a:ln w="15875">
+            <a:solidFill>
+              <a:schemeClr val="bg1">
+                <a:lumMod val="65000"/>
+              </a:schemeClr>
+            </a:solidFill>
+          </a:ln>
+        </p:spPr>
+        <p:style>
+          <a:lnRef idx="2">
+            <a:schemeClr val="accent1">
+              <a:shade val="50000"/>
+            </a:schemeClr>
+          </a:lnRef>
+          <a:fillRef idx="1">
+            <a:schemeClr val="accent1"/>
+          </a:fillRef>
+          <a:effectRef idx="0">
+            <a:schemeClr val="accent1"/>
+          </a:effectRef>
+          <a:fontRef idx="minor">
+            <a:schemeClr val="lt1"/>
+          </a:fontRef>
+        </p:style>
+        <p:txBody>
+          <a:bodyPr rtlCol="0" anchor="ctr"/>
+          <a:lstStyle/>
+          <a:p>
+            <a:pPr algn="ctr"/>
+            <a:endParaRPr lang="pt-BR"/>
+          </a:p>
+        </p:txBody>
+      </p:sp>
+      <p:grpSp>
+        <p:nvGrpSpPr>
+          <p:cNvPr id="7" name="Agrupar 6">
+            <a:extLst>
+              <a:ext uri="{FF2B5EF4-FFF2-40B4-BE49-F238E27FC236}">
+                <a16:creationId xmlns:a16="http://schemas.microsoft.com/office/drawing/2014/main" id="{A2E8FCC9-C34A-4D3A-9756-E720BF2E2DF0}"/>
+              </a:ext>
+            </a:extLst>
+          </p:cNvPr>
+          <p:cNvGrpSpPr/>
+          <p:nvPr/>
+        </p:nvGrpSpPr>
+        <p:grpSpPr>
+          <a:xfrm>
+            <a:off x="-246392" y="36254"/>
+            <a:ext cx="161800" cy="422289"/>
+            <a:chOff x="-246392" y="36254"/>
+            <a:chExt cx="161800" cy="422289"/>
+          </a:xfrm>
+        </p:grpSpPr>
+        <p:sp>
+          <p:nvSpPr>
+            <p:cNvPr id="8" name="Retângulo 7">
+              <a:extLst>
+                <a:ext uri="{FF2B5EF4-FFF2-40B4-BE49-F238E27FC236}">
+                  <a16:creationId xmlns:a16="http://schemas.microsoft.com/office/drawing/2014/main" id="{C1257C45-9BD3-4FEC-9DC8-D46B5EC3030F}"/>
+                </a:ext>
+              </a:extLst>
+            </p:cNvPr>
+            <p:cNvSpPr/>
+            <p:nvPr/>
+          </p:nvSpPr>
+          <p:spPr>
+            <a:xfrm>
+              <a:off x="-241692" y="36254"/>
+              <a:ext cx="157100" cy="185297"/>
+            </a:xfrm>
+            <a:prstGeom prst="rect">
+              <a:avLst/>
+            </a:prstGeom>
+            <a:solidFill>
+              <a:srgbClr val="B5DE00"/>
+            </a:solidFill>
+            <a:ln>
+              <a:noFill/>
+            </a:ln>
+          </p:spPr>
+          <p:style>
+            <a:lnRef idx="2">
+              <a:schemeClr val="accent1">
+                <a:shade val="50000"/>
+              </a:schemeClr>
+            </a:lnRef>
+            <a:fillRef idx="1">
+              <a:schemeClr val="accent1"/>
+            </a:fillRef>
+            <a:effectRef idx="0">
+              <a:schemeClr val="accent1"/>
+            </a:effectRef>
+            <a:fontRef idx="minor">
+              <a:schemeClr val="lt1"/>
+            </a:fontRef>
+          </p:style>
+          <p:txBody>
+            <a:bodyPr rtlCol="0" anchor="ctr"/>
+            <a:lstStyle/>
+            <a:p>
+              <a:pPr algn="ctr"/>
+              <a:endParaRPr lang="pt-BR"/>
+            </a:p>
+          </p:txBody>
+        </p:sp>
+        <p:sp>
+          <p:nvSpPr>
+            <p:cNvPr id="9" name="Retângulo 8">
+              <a:extLst>
+                <a:ext uri="{FF2B5EF4-FFF2-40B4-BE49-F238E27FC236}">
+                  <a16:creationId xmlns:a16="http://schemas.microsoft.com/office/drawing/2014/main" id="{566DA9BC-C3EA-4E07-8C71-C7BCE3651ADD}"/>
+                </a:ext>
+              </a:extLst>
+            </p:cNvPr>
+            <p:cNvSpPr/>
+            <p:nvPr/>
+          </p:nvSpPr>
+          <p:spPr>
+            <a:xfrm>
+              <a:off x="-246392" y="273246"/>
+              <a:ext cx="157100" cy="185297"/>
+            </a:xfrm>
+            <a:prstGeom prst="rect">
+              <a:avLst/>
+            </a:prstGeom>
+            <a:solidFill>
+              <a:srgbClr val="34977E"/>
+            </a:solidFill>
+            <a:ln>
+              <a:noFill/>
+            </a:ln>
+          </p:spPr>
+          <p:style>
+            <a:lnRef idx="2">
+              <a:schemeClr val="accent1">
+                <a:shade val="50000"/>
+              </a:schemeClr>
+            </a:lnRef>
+            <a:fillRef idx="1">
+              <a:schemeClr val="accent1"/>
+            </a:fillRef>
+            <a:effectRef idx="0">
+              <a:schemeClr val="accent1"/>
+            </a:effectRef>
+            <a:fontRef idx="minor">
+              <a:schemeClr val="lt1"/>
+            </a:fontRef>
+          </p:style>
+          <p:txBody>
+            <a:bodyPr rtlCol="0" anchor="ctr"/>
+            <a:lstStyle/>
+            <a:p>
+              <a:pPr algn="ctr"/>
+              <a:endParaRPr lang="pt-BR"/>
+            </a:p>
+          </p:txBody>
+        </p:sp>
+      </p:grpSp>
     </p:spTree>
     <p:extLst>
       <p:ext uri="{BB962C8B-B14F-4D97-AF65-F5344CB8AC3E}">
@@ -5051,7 +7839,7 @@
             <a:r>
               <a:rPr lang="pt-BR" sz="2400" dirty="0" err="1">
                 <a:solidFill>
-                  <a:srgbClr val="E89B26"/>
+                  <a:srgbClr val="B5DE00"/>
                 </a:solidFill>
                 <a:latin typeface="Tahoma" panose="020B0604030504040204" pitchFamily="34" charset="0"/>
                 <a:ea typeface="Tahoma" panose="020B0604030504040204" pitchFamily="34" charset="0"/>
@@ -5061,7 +7849,7 @@
             </a:r>
             <a:endParaRPr lang="pt-BR" sz="2400" dirty="0">
               <a:solidFill>
-                <a:srgbClr val="E89B26"/>
+                <a:srgbClr val="B5DE00"/>
               </a:solidFill>
               <a:latin typeface="Tahoma" panose="020B0604030504040204" pitchFamily="34" charset="0"/>
               <a:ea typeface="Tahoma" panose="020B0604030504040204" pitchFamily="34" charset="0"/>
@@ -5070,6 +7858,185 @@
           </a:p>
         </p:txBody>
       </p:sp>
+      <p:sp>
+        <p:nvSpPr>
+          <p:cNvPr id="3" name="Retângulo 2">
+            <a:extLst>
+              <a:ext uri="{FF2B5EF4-FFF2-40B4-BE49-F238E27FC236}">
+                <a16:creationId xmlns:a16="http://schemas.microsoft.com/office/drawing/2014/main" id="{2F90FE4E-2F91-465F-9632-3468B2E89FB5}"/>
+              </a:ext>
+            </a:extLst>
+          </p:cNvPr>
+          <p:cNvSpPr/>
+          <p:nvPr/>
+        </p:nvSpPr>
+        <p:spPr>
+          <a:xfrm>
+            <a:off x="0" y="0"/>
+            <a:ext cx="1979612" cy="1979613"/>
+          </a:xfrm>
+          <a:prstGeom prst="rect">
+            <a:avLst/>
+          </a:prstGeom>
+          <a:noFill/>
+          <a:ln w="15875">
+            <a:solidFill>
+              <a:schemeClr val="bg1">
+                <a:lumMod val="65000"/>
+              </a:schemeClr>
+            </a:solidFill>
+          </a:ln>
+        </p:spPr>
+        <p:style>
+          <a:lnRef idx="2">
+            <a:schemeClr val="accent1">
+              <a:shade val="50000"/>
+            </a:schemeClr>
+          </a:lnRef>
+          <a:fillRef idx="1">
+            <a:schemeClr val="accent1"/>
+          </a:fillRef>
+          <a:effectRef idx="0">
+            <a:schemeClr val="accent1"/>
+          </a:effectRef>
+          <a:fontRef idx="minor">
+            <a:schemeClr val="lt1"/>
+          </a:fontRef>
+        </p:style>
+        <p:txBody>
+          <a:bodyPr rtlCol="0" anchor="ctr"/>
+          <a:lstStyle/>
+          <a:p>
+            <a:pPr algn="ctr"/>
+            <a:endParaRPr lang="pt-BR"/>
+          </a:p>
+        </p:txBody>
+      </p:sp>
+      <p:grpSp>
+        <p:nvGrpSpPr>
+          <p:cNvPr id="5" name="Agrupar 4">
+            <a:extLst>
+              <a:ext uri="{FF2B5EF4-FFF2-40B4-BE49-F238E27FC236}">
+                <a16:creationId xmlns:a16="http://schemas.microsoft.com/office/drawing/2014/main" id="{29A59A8B-B1D0-4635-BABF-AAF47213CA1B}"/>
+              </a:ext>
+            </a:extLst>
+          </p:cNvPr>
+          <p:cNvGrpSpPr/>
+          <p:nvPr/>
+        </p:nvGrpSpPr>
+        <p:grpSpPr>
+          <a:xfrm>
+            <a:off x="-246392" y="36254"/>
+            <a:ext cx="161800" cy="422289"/>
+            <a:chOff x="-246392" y="36254"/>
+            <a:chExt cx="161800" cy="422289"/>
+          </a:xfrm>
+        </p:grpSpPr>
+        <p:sp>
+          <p:nvSpPr>
+            <p:cNvPr id="6" name="Retângulo 5">
+              <a:extLst>
+                <a:ext uri="{FF2B5EF4-FFF2-40B4-BE49-F238E27FC236}">
+                  <a16:creationId xmlns:a16="http://schemas.microsoft.com/office/drawing/2014/main" id="{3B355814-90EE-476F-AB92-15B1A191589E}"/>
+                </a:ext>
+              </a:extLst>
+            </p:cNvPr>
+            <p:cNvSpPr/>
+            <p:nvPr/>
+          </p:nvSpPr>
+          <p:spPr>
+            <a:xfrm>
+              <a:off x="-241692" y="36254"/>
+              <a:ext cx="157100" cy="185297"/>
+            </a:xfrm>
+            <a:prstGeom prst="rect">
+              <a:avLst/>
+            </a:prstGeom>
+            <a:solidFill>
+              <a:srgbClr val="B5DE00"/>
+            </a:solidFill>
+            <a:ln>
+              <a:noFill/>
+            </a:ln>
+          </p:spPr>
+          <p:style>
+            <a:lnRef idx="2">
+              <a:schemeClr val="accent1">
+                <a:shade val="50000"/>
+              </a:schemeClr>
+            </a:lnRef>
+            <a:fillRef idx="1">
+              <a:schemeClr val="accent1"/>
+            </a:fillRef>
+            <a:effectRef idx="0">
+              <a:schemeClr val="accent1"/>
+            </a:effectRef>
+            <a:fontRef idx="minor">
+              <a:schemeClr val="lt1"/>
+            </a:fontRef>
+          </p:style>
+          <p:txBody>
+            <a:bodyPr rtlCol="0" anchor="ctr"/>
+            <a:lstStyle/>
+            <a:p>
+              <a:pPr algn="ctr"/>
+              <a:endParaRPr lang="pt-BR"/>
+            </a:p>
+          </p:txBody>
+        </p:sp>
+        <p:sp>
+          <p:nvSpPr>
+            <p:cNvPr id="7" name="Retângulo 6">
+              <a:extLst>
+                <a:ext uri="{FF2B5EF4-FFF2-40B4-BE49-F238E27FC236}">
+                  <a16:creationId xmlns:a16="http://schemas.microsoft.com/office/drawing/2014/main" id="{44731F60-38D3-4881-A1E3-E6FC871C0095}"/>
+                </a:ext>
+              </a:extLst>
+            </p:cNvPr>
+            <p:cNvSpPr/>
+            <p:nvPr/>
+          </p:nvSpPr>
+          <p:spPr>
+            <a:xfrm>
+              <a:off x="-246392" y="273246"/>
+              <a:ext cx="157100" cy="185297"/>
+            </a:xfrm>
+            <a:prstGeom prst="rect">
+              <a:avLst/>
+            </a:prstGeom>
+            <a:solidFill>
+              <a:srgbClr val="34977E"/>
+            </a:solidFill>
+            <a:ln>
+              <a:noFill/>
+            </a:ln>
+          </p:spPr>
+          <p:style>
+            <a:lnRef idx="2">
+              <a:schemeClr val="accent1">
+                <a:shade val="50000"/>
+              </a:schemeClr>
+            </a:lnRef>
+            <a:fillRef idx="1">
+              <a:schemeClr val="accent1"/>
+            </a:fillRef>
+            <a:effectRef idx="0">
+              <a:schemeClr val="accent1"/>
+            </a:effectRef>
+            <a:fontRef idx="minor">
+              <a:schemeClr val="lt1"/>
+            </a:fontRef>
+          </p:style>
+          <p:txBody>
+            <a:bodyPr rtlCol="0" anchor="ctr"/>
+            <a:lstStyle/>
+            <a:p>
+              <a:pPr algn="ctr"/>
+              <a:endParaRPr lang="pt-BR"/>
+            </a:p>
+          </p:txBody>
+        </p:sp>
+      </p:grpSp>
     </p:spTree>
     <p:extLst>
       <p:ext uri="{BB962C8B-B14F-4D97-AF65-F5344CB8AC3E}">

</xml_diff>